<commit_message>
JIRAGITHUB-3 next presentation for next Princeton Lean Agile Lightning Talk
</commit_message>
<xml_diff>
--- a/Git Integration Options for Jira.pptx
+++ b/Git Integration Options for Jira.pptx
@@ -8,8 +8,12 @@
     <p:sldId id="256" r:id="rId2"/>
     <p:sldId id="271" r:id="rId3"/>
     <p:sldId id="272" r:id="rId4"/>
-    <p:sldId id="265" r:id="rId5"/>
-    <p:sldId id="260" r:id="rId6"/>
+    <p:sldId id="273" r:id="rId5"/>
+    <p:sldId id="274" r:id="rId6"/>
+    <p:sldId id="275" r:id="rId7"/>
+    <p:sldId id="276" r:id="rId8"/>
+    <p:sldId id="265" r:id="rId9"/>
+    <p:sldId id="260" r:id="rId10"/>
   </p:sldIdLst>
   <p:sldSz cx="9144000" cy="6858000" type="screen4x3"/>
   <p:notesSz cx="6858000" cy="9144000"/>
@@ -3404,7 +3408,7 @@
         <p:spPr>
           <a:xfrm>
             <a:off x="304800" y="1371600"/>
-            <a:ext cx="8534400" cy="4876800"/>
+            <a:ext cx="8534400" cy="5334000"/>
           </a:xfrm>
         </p:spPr>
         <p:txBody>
@@ -3420,7 +3424,11 @@
               <a:buNone/>
             </a:pPr>
             <a:r>
-              <a:rPr lang="en-US" sz="2400" dirty="0"/>
+              <a:rPr lang="en-US" sz="2400" b="1" dirty="0">
+                <a:solidFill>
+                  <a:srgbClr val="FF0000"/>
+                </a:solidFill>
+              </a:rPr>
               <a:t>JOB 1</a:t>
             </a:r>
           </a:p>
@@ -3462,7 +3470,11 @@
               <a:buNone/>
             </a:pPr>
             <a:r>
-              <a:rPr lang="en-US" sz="2400" dirty="0"/>
+              <a:rPr lang="en-US" sz="2400" b="1" dirty="0">
+                <a:solidFill>
+                  <a:srgbClr val="00B050"/>
+                </a:solidFill>
+              </a:rPr>
               <a:t>EXTRA</a:t>
             </a:r>
           </a:p>
@@ -3585,19 +3597,19 @@
         </p:spPr>
         <p:txBody>
           <a:bodyPr>
-            <a:normAutofit fontScale="90000"/>
+            <a:noAutofit/>
           </a:bodyPr>
           <a:lstStyle/>
           <a:p>
             <a:r>
-              <a:rPr lang="en-US" dirty="0"/>
-              <a:t>Why Have This Integration?</a:t>
+              <a:rPr lang="en-US" sz="3600" dirty="0"/>
+              <a:t>What Are The Benefits? Why Have This?</a:t>
             </a:r>
             <a:br>
-              <a:rPr lang="en-US" dirty="0"/>
+              <a:rPr lang="en-US" sz="3600" dirty="0"/>
             </a:br>
             <a:r>
-              <a:rPr lang="en-US" dirty="0"/>
+              <a:rPr lang="en-US" sz="3600" dirty="0"/>
               <a:t>Who Is The Customer?</a:t>
             </a:r>
           </a:p>
@@ -3629,12 +3641,22 @@
               <a:spcBef>
                 <a:spcPts val="0"/>
               </a:spcBef>
-              <a:buFontTx/>
-              <a:buChar char="-"/>
             </a:pPr>
             <a:r>
               <a:rPr lang="en-US" sz="2000" dirty="0"/>
-              <a:t>Anyone who needs to know what code was written for Jira issues and see it in an familiar environment (developers, product managers)</a:t>
+              <a:t>Anyone who needs to know what code was written for Jira issues and review it in a familiar environment (</a:t>
+            </a:r>
+            <a:r>
+              <a:rPr lang="en-US" sz="2000" dirty="0">
+                <a:solidFill>
+                  <a:srgbClr val="00B050"/>
+                </a:solidFill>
+              </a:rPr>
+              <a:t>developers</a:t>
+            </a:r>
+            <a:r>
+              <a:rPr lang="en-US" sz="2000" dirty="0"/>
+              <a:t>)</a:t>
             </a:r>
           </a:p>
           <a:p>
@@ -3642,61 +3664,114 @@
               <a:spcBef>
                 <a:spcPts val="0"/>
               </a:spcBef>
-              <a:buFontTx/>
-              <a:buChar char="-"/>
             </a:pPr>
-            <a:endParaRPr lang="en-US" sz="2000" dirty="0"/>
-          </a:p>
-          <a:p>
-            <a:pPr marL="22860" indent="0">
+            <a:r>
+              <a:rPr lang="en-US" sz="2000" dirty="0"/>
+              <a:t>Anyone who wants to (lightly) track progress against features (</a:t>
+            </a:r>
+            <a:r>
+              <a:rPr lang="en-US" sz="2000" dirty="0">
+                <a:solidFill>
+                  <a:srgbClr val="00B0F0"/>
+                </a:solidFill>
+              </a:rPr>
+              <a:t>product managers</a:t>
+            </a:r>
+            <a:r>
+              <a:rPr lang="en-US" sz="2000" dirty="0"/>
+              <a:t>)</a:t>
+            </a:r>
+          </a:p>
+          <a:p>
+            <a:pPr marL="365760">
               <a:spcBef>
                 <a:spcPts val="0"/>
               </a:spcBef>
-              <a:buNone/>
             </a:pPr>
             <a:r>
               <a:rPr lang="en-US" sz="2000" dirty="0"/>
-              <a:t>	(other developers, product </a:t>
-            </a:r>
-            <a:r>
-              <a:rPr lang="en-US" sz="2000" dirty="0" err="1"/>
-              <a:t>maangers</a:t>
+              <a:t>Anyone who needs to support the code in production, or be able to answer questions/resolve problems related to new functionality or security (</a:t>
+            </a:r>
+            <a:r>
+              <a:rPr lang="en-US" sz="2000" dirty="0">
+                <a:solidFill>
+                  <a:srgbClr val="7030A0"/>
+                </a:solidFill>
+              </a:rPr>
+              <a:t>operational support, helpdesk, security engineers/pen testers</a:t>
             </a:r>
             <a:r>
               <a:rPr lang="en-US" sz="2000" dirty="0"/>
-              <a:t>, operational support, help desk)</a:t>
-            </a:r>
-          </a:p>
-          <a:p>
-            <a:pPr marL="22860" indent="0">
+              <a:t>)</a:t>
+            </a:r>
+          </a:p>
+          <a:p>
+            <a:pPr marL="365760">
               <a:spcBef>
                 <a:spcPts val="0"/>
               </a:spcBef>
-              <a:buNone/>
             </a:pPr>
             <a:r>
               <a:rPr lang="en-US" sz="2000" dirty="0"/>
-              <a:t>- anyone who needs to pull statistics on code relative to Jira issues (complexity vs commits, commit rollbacks)</a:t>
-            </a:r>
-          </a:p>
-          <a:p>
-            <a:pPr marL="22860" indent="0">
+              <a:t>Anyone who needs to pull statistics on code relative to Jira issues such as complexity vs commits, commit rollbacks, bugs against features (</a:t>
+            </a:r>
+            <a:r>
+              <a:rPr lang="en-US" sz="2000" dirty="0">
+                <a:solidFill>
+                  <a:srgbClr val="FF0000"/>
+                </a:solidFill>
+              </a:rPr>
+              <a:t>scrum masters, dev team leads</a:t>
+            </a:r>
+            <a:r>
+              <a:rPr lang="en-US" sz="2000" dirty="0"/>
+              <a:t>)</a:t>
+            </a:r>
+          </a:p>
+          <a:p>
+            <a:pPr marL="365760">
               <a:spcBef>
                 <a:spcPts val="0"/>
               </a:spcBef>
-              <a:buNone/>
             </a:pPr>
             <a:r>
               <a:rPr lang="en-US" sz="2000" dirty="0"/>
-              <a:t>- anyone who wants to automate certain </a:t>
-            </a:r>
-            <a:r>
-              <a:rPr lang="en-US" sz="2000" dirty="0" err="1"/>
-              <a:t>jira</a:t>
+              <a:t>Anyone who wants to automate certain Jira functions during code dev cycle (</a:t>
+            </a:r>
+            <a:r>
+              <a:rPr lang="en-US" sz="2000" dirty="0">
+                <a:solidFill>
+                  <a:srgbClr val="00B0F0"/>
+                </a:solidFill>
+              </a:rPr>
+              <a:t>release managers</a:t>
             </a:r>
             <a:r>
               <a:rPr lang="en-US" sz="2000" dirty="0"/>
-              <a:t> functions during code processing cycle</a:t>
+              <a:t>)</a:t>
+            </a:r>
+          </a:p>
+          <a:p>
+            <a:pPr marL="365760">
+              <a:spcBef>
+                <a:spcPts val="0"/>
+              </a:spcBef>
+            </a:pPr>
+            <a:r>
+              <a:rPr lang="en-US" sz="2000" dirty="0"/>
+              <a:t>Anyone doing CI/CD who wants to build specific branches containing specific commits (</a:t>
+            </a:r>
+            <a:r>
+              <a:rPr lang="en-US" sz="2000" dirty="0">
+                <a:solidFill>
+                  <a:srgbClr val="00B050"/>
+                </a:solidFill>
+              </a:rPr>
+              <a:t>release managers, DevOps engineers</a:t>
+            </a:r>
+            <a:r>
+              <a:rPr lang="en-US" sz="2000" dirty="0"/>
+              <a:t>)</a:t>
             </a:r>
           </a:p>
           <a:p>
@@ -3731,6 +3806,925 @@
 </file>
 
 <file path=ppt/slides/slide4.xml><?xml version="1.0" encoding="utf-8"?>
+<p:sld xmlns:a="http://schemas.openxmlformats.org/drawingml/2006/main" xmlns:r="http://schemas.openxmlformats.org/officeDocument/2006/relationships" xmlns:p="http://schemas.openxmlformats.org/presentationml/2006/main">
+  <p:cSld>
+    <p:bg>
+      <p:bgPr>
+        <a:solidFill>
+          <a:schemeClr val="accent1">
+            <a:lumMod val="20000"/>
+            <a:lumOff val="80000"/>
+          </a:schemeClr>
+        </a:solidFill>
+        <a:effectLst/>
+      </p:bgPr>
+    </p:bg>
+    <p:spTree>
+      <p:nvGrpSpPr>
+        <p:cNvPr id="1" name=""/>
+        <p:cNvGrpSpPr/>
+        <p:nvPr/>
+      </p:nvGrpSpPr>
+      <p:grpSpPr>
+        <a:xfrm>
+          <a:off x="0" y="0"/>
+          <a:ext cx="0" cy="0"/>
+          <a:chOff x="0" y="0"/>
+          <a:chExt cx="0" cy="0"/>
+        </a:xfrm>
+      </p:grpSpPr>
+      <p:sp>
+        <p:nvSpPr>
+          <p:cNvPr id="2" name="Title 1"/>
+          <p:cNvSpPr>
+            <a:spLocks noGrp="1"/>
+          </p:cNvSpPr>
+          <p:nvPr>
+            <p:ph type="title"/>
+          </p:nvPr>
+        </p:nvSpPr>
+        <p:spPr>
+          <a:xfrm>
+            <a:off x="457200" y="274638"/>
+            <a:ext cx="8229600" cy="1143000"/>
+          </a:xfrm>
+        </p:spPr>
+        <p:txBody>
+          <a:bodyPr>
+            <a:normAutofit/>
+          </a:bodyPr>
+          <a:lstStyle/>
+          <a:p>
+            <a:r>
+              <a:rPr lang="en-US" dirty="0"/>
+              <a:t>Product Landscape</a:t>
+            </a:r>
+          </a:p>
+        </p:txBody>
+      </p:sp>
+      <p:sp>
+        <p:nvSpPr>
+          <p:cNvPr id="3" name="Content Placeholder 2"/>
+          <p:cNvSpPr>
+            <a:spLocks noGrp="1"/>
+          </p:cNvSpPr>
+          <p:nvPr>
+            <p:ph idx="1"/>
+          </p:nvPr>
+        </p:nvSpPr>
+        <p:spPr>
+          <a:xfrm>
+            <a:off x="457200" y="1600200"/>
+            <a:ext cx="8229600" cy="4800600"/>
+          </a:xfrm>
+        </p:spPr>
+        <p:txBody>
+          <a:bodyPr>
+            <a:noAutofit/>
+          </a:bodyPr>
+          <a:lstStyle/>
+          <a:p>
+            <a:pPr marL="22860" indent="0">
+              <a:spcBef>
+                <a:spcPts val="0"/>
+              </a:spcBef>
+              <a:buNone/>
+            </a:pPr>
+            <a:r>
+              <a:rPr lang="en-US" sz="2000" dirty="0"/>
+              <a:t>(using public GitHub specifically as an example, some options do not support GitHub Enterprise, GitLab or other third-party Git incarnations)</a:t>
+            </a:r>
+          </a:p>
+          <a:p>
+            <a:pPr marL="22860" indent="0">
+              <a:spcBef>
+                <a:spcPts val="0"/>
+              </a:spcBef>
+              <a:buNone/>
+            </a:pPr>
+            <a:endParaRPr lang="en-US" sz="2800" dirty="0"/>
+          </a:p>
+          <a:p>
+            <a:pPr marL="365760">
+              <a:spcBef>
+                <a:spcPts val="0"/>
+              </a:spcBef>
+              <a:buFontTx/>
+              <a:buChar char="-"/>
+            </a:pPr>
+            <a:r>
+              <a:rPr lang="en-US" dirty="0"/>
+              <a:t>Atlassian’s built-in integration (cloud, server)</a:t>
+            </a:r>
+          </a:p>
+          <a:p>
+            <a:pPr marL="365760">
+              <a:spcBef>
+                <a:spcPts val="0"/>
+              </a:spcBef>
+              <a:buFontTx/>
+              <a:buChar char="-"/>
+            </a:pPr>
+            <a:r>
+              <a:rPr lang="en-US" dirty="0"/>
+              <a:t>GitHub’s built-in integration (cloud)*</a:t>
+            </a:r>
+          </a:p>
+          <a:p>
+            <a:pPr marL="365760">
+              <a:spcBef>
+                <a:spcPts val="0"/>
+              </a:spcBef>
+              <a:buFontTx/>
+              <a:buChar char="-"/>
+            </a:pPr>
+            <a:r>
+              <a:rPr lang="en-US" dirty="0"/>
+              <a:t>Third-party Jira plug-ins (cloud, server)</a:t>
+            </a:r>
+          </a:p>
+          <a:p>
+            <a:pPr marL="765810" lvl="1">
+              <a:spcBef>
+                <a:spcPts val="0"/>
+              </a:spcBef>
+              <a:buFontTx/>
+              <a:buChar char="-"/>
+            </a:pPr>
+            <a:r>
+              <a:rPr lang="en-US" sz="2400" dirty="0">
+                <a:solidFill>
+                  <a:srgbClr val="FF0000"/>
+                </a:solidFill>
+              </a:rPr>
+              <a:t>Git Integration for Jira plug-in from </a:t>
+            </a:r>
+            <a:r>
+              <a:rPr lang="en-US" sz="2400" dirty="0" err="1">
+                <a:solidFill>
+                  <a:srgbClr val="FF0000"/>
+                </a:solidFill>
+              </a:rPr>
+              <a:t>BigBrassBand</a:t>
+            </a:r>
+            <a:endParaRPr lang="en-US" sz="2400" dirty="0">
+              <a:solidFill>
+                <a:srgbClr val="FF0000"/>
+              </a:solidFill>
+            </a:endParaRPr>
+          </a:p>
+          <a:p>
+            <a:pPr marL="365760">
+              <a:spcBef>
+                <a:spcPts val="0"/>
+              </a:spcBef>
+              <a:buFontTx/>
+              <a:buChar char="-"/>
+            </a:pPr>
+            <a:r>
+              <a:rPr lang="en-US" dirty="0"/>
+              <a:t>Home-grown scripts</a:t>
+            </a:r>
+          </a:p>
+          <a:p>
+            <a:pPr marL="765810" lvl="1">
+              <a:spcBef>
+                <a:spcPts val="0"/>
+              </a:spcBef>
+              <a:buFontTx/>
+              <a:buChar char="-"/>
+            </a:pPr>
+            <a:r>
+              <a:rPr lang="en-US" sz="2400" dirty="0" err="1">
+                <a:solidFill>
+                  <a:srgbClr val="FF0000"/>
+                </a:solidFill>
+              </a:rPr>
+              <a:t>jiragithub</a:t>
+            </a:r>
+            <a:r>
+              <a:rPr lang="en-US" sz="2400" dirty="0">
+                <a:solidFill>
+                  <a:srgbClr val="FF0000"/>
+                </a:solidFill>
+              </a:rPr>
+              <a:t> sync script (yes, it’s available on GitHub)</a:t>
+            </a:r>
+          </a:p>
+          <a:p>
+            <a:pPr marL="365760">
+              <a:spcBef>
+                <a:spcPts val="0"/>
+              </a:spcBef>
+            </a:pPr>
+            <a:endParaRPr lang="en-US" sz="2800" dirty="0"/>
+          </a:p>
+          <a:p>
+            <a:pPr marL="22860" indent="0">
+              <a:spcBef>
+                <a:spcPts val="0"/>
+              </a:spcBef>
+              <a:buNone/>
+            </a:pPr>
+            <a:r>
+              <a:rPr lang="en-US" sz="1600" dirty="0"/>
+              <a:t>* GitHub has “issue” functionality, but no strong workflow model, and their integration marketplace is not yet as mature as Atlassian’s</a:t>
+            </a:r>
+          </a:p>
+          <a:p>
+            <a:pPr marL="365760">
+              <a:spcBef>
+                <a:spcPts val="0"/>
+              </a:spcBef>
+            </a:pPr>
+            <a:endParaRPr lang="en-US" sz="2800" dirty="0"/>
+          </a:p>
+        </p:txBody>
+      </p:sp>
+    </p:spTree>
+    <p:extLst>
+      <p:ext uri="{BB962C8B-B14F-4D97-AF65-F5344CB8AC3E}">
+        <p14:creationId xmlns:p14="http://schemas.microsoft.com/office/powerpoint/2010/main" val="3673240124"/>
+      </p:ext>
+    </p:extLst>
+  </p:cSld>
+  <p:clrMapOvr>
+    <a:masterClrMapping/>
+  </p:clrMapOvr>
+</p:sld>
+</file>
+
+<file path=ppt/slides/slide5.xml><?xml version="1.0" encoding="utf-8"?>
+<p:sld xmlns:a="http://schemas.openxmlformats.org/drawingml/2006/main" xmlns:r="http://schemas.openxmlformats.org/officeDocument/2006/relationships" xmlns:p="http://schemas.openxmlformats.org/presentationml/2006/main">
+  <p:cSld>
+    <p:bg>
+      <p:bgPr>
+        <a:solidFill>
+          <a:schemeClr val="accent1">
+            <a:lumMod val="20000"/>
+            <a:lumOff val="80000"/>
+          </a:schemeClr>
+        </a:solidFill>
+        <a:effectLst/>
+      </p:bgPr>
+    </p:bg>
+    <p:spTree>
+      <p:nvGrpSpPr>
+        <p:cNvPr id="1" name=""/>
+        <p:cNvGrpSpPr/>
+        <p:nvPr/>
+      </p:nvGrpSpPr>
+      <p:grpSpPr>
+        <a:xfrm>
+          <a:off x="0" y="0"/>
+          <a:ext cx="0" cy="0"/>
+          <a:chOff x="0" y="0"/>
+          <a:chExt cx="0" cy="0"/>
+        </a:xfrm>
+      </p:grpSpPr>
+      <p:sp>
+        <p:nvSpPr>
+          <p:cNvPr id="2" name="Title 1"/>
+          <p:cNvSpPr>
+            <a:spLocks noGrp="1"/>
+          </p:cNvSpPr>
+          <p:nvPr>
+            <p:ph type="title"/>
+          </p:nvPr>
+        </p:nvSpPr>
+        <p:spPr>
+          <a:xfrm>
+            <a:off x="457200" y="274638"/>
+            <a:ext cx="8229600" cy="1143000"/>
+          </a:xfrm>
+        </p:spPr>
+        <p:txBody>
+          <a:bodyPr>
+            <a:normAutofit/>
+          </a:bodyPr>
+          <a:lstStyle/>
+          <a:p>
+            <a:r>
+              <a:rPr lang="en-US" dirty="0"/>
+              <a:t>Pros/Cons: Plug-In vs Script</a:t>
+            </a:r>
+          </a:p>
+        </p:txBody>
+      </p:sp>
+      <p:graphicFrame>
+        <p:nvGraphicFramePr>
+          <p:cNvPr id="8" name="Table 8">
+            <a:extLst>
+              <a:ext uri="{FF2B5EF4-FFF2-40B4-BE49-F238E27FC236}">
+                <a16:creationId xmlns:a16="http://schemas.microsoft.com/office/drawing/2014/main" id="{E04F73FD-F461-4FB0-9C62-271DCEF41A5C}"/>
+              </a:ext>
+            </a:extLst>
+          </p:cNvPr>
+          <p:cNvGraphicFramePr>
+            <a:graphicFrameLocks noGrp="1"/>
+          </p:cNvGraphicFramePr>
+          <p:nvPr>
+            <p:ph idx="1"/>
+            <p:extLst>
+              <p:ext uri="{D42A27DB-BD31-4B8C-83A1-F6EECF244321}">
+                <p14:modId xmlns:p14="http://schemas.microsoft.com/office/powerpoint/2010/main" val="2443283656"/>
+              </p:ext>
+            </p:extLst>
+          </p:nvPr>
+        </p:nvGraphicFramePr>
+        <p:xfrm>
+          <a:off x="457200" y="1417638"/>
+          <a:ext cx="8229600" cy="4983162"/>
+        </p:xfrm>
+        <a:graphic>
+          <a:graphicData uri="http://schemas.openxmlformats.org/drawingml/2006/table">
+            <a:tbl>
+              <a:tblPr firstRow="1" bandRow="1">
+                <a:tableStyleId>{5C22544A-7EE6-4342-B048-85BDC9FD1C3A}</a:tableStyleId>
+              </a:tblPr>
+              <a:tblGrid>
+                <a:gridCol w="1219200">
+                  <a:extLst>
+                    <a:ext uri="{9D8B030D-6E8A-4147-A177-3AD203B41FA5}">
+                      <a16:colId xmlns:a16="http://schemas.microsoft.com/office/drawing/2014/main" val="839328944"/>
+                    </a:ext>
+                  </a:extLst>
+                </a:gridCol>
+                <a:gridCol w="3429000">
+                  <a:extLst>
+                    <a:ext uri="{9D8B030D-6E8A-4147-A177-3AD203B41FA5}">
+                      <a16:colId xmlns:a16="http://schemas.microsoft.com/office/drawing/2014/main" val="663025966"/>
+                    </a:ext>
+                  </a:extLst>
+                </a:gridCol>
+                <a:gridCol w="3581400">
+                  <a:extLst>
+                    <a:ext uri="{9D8B030D-6E8A-4147-A177-3AD203B41FA5}">
+                      <a16:colId xmlns:a16="http://schemas.microsoft.com/office/drawing/2014/main" val="136273586"/>
+                    </a:ext>
+                  </a:extLst>
+                </a:gridCol>
+              </a:tblGrid>
+              <a:tr h="516687">
+                <a:tc>
+                  <a:txBody>
+                    <a:bodyPr/>
+                    <a:lstStyle/>
+                    <a:p>
+                      <a:r>
+                        <a:rPr lang="en-US" dirty="0"/>
+                        <a:t>Product</a:t>
+                      </a:r>
+                    </a:p>
+                  </a:txBody>
+                  <a:tcPr/>
+                </a:tc>
+                <a:tc>
+                  <a:txBody>
+                    <a:bodyPr/>
+                    <a:lstStyle/>
+                    <a:p>
+                      <a:pPr algn="ctr"/>
+                      <a:r>
+                        <a:rPr lang="en-US" dirty="0"/>
+                        <a:t>Pros</a:t>
+                      </a:r>
+                    </a:p>
+                  </a:txBody>
+                  <a:tcPr/>
+                </a:tc>
+                <a:tc>
+                  <a:txBody>
+                    <a:bodyPr/>
+                    <a:lstStyle/>
+                    <a:p>
+                      <a:pPr algn="ctr"/>
+                      <a:r>
+                        <a:rPr lang="en-US" dirty="0"/>
+                        <a:t>Cons</a:t>
+                      </a:r>
+                    </a:p>
+                  </a:txBody>
+                  <a:tcPr/>
+                </a:tc>
+                <a:extLst>
+                  <a:ext uri="{0D108BD9-81ED-4DB2-BD59-A6C34878D82A}">
+                    <a16:rowId xmlns:a16="http://schemas.microsoft.com/office/drawing/2014/main" val="3515496124"/>
+                  </a:ext>
+                </a:extLst>
+              </a:tr>
+              <a:tr h="2859003">
+                <a:tc>
+                  <a:txBody>
+                    <a:bodyPr/>
+                    <a:lstStyle/>
+                    <a:p>
+                      <a:endParaRPr lang="en-US" dirty="0"/>
+                    </a:p>
+                    <a:p>
+                      <a:endParaRPr lang="en-US" dirty="0"/>
+                    </a:p>
+                    <a:p>
+                      <a:r>
+                        <a:rPr lang="en-US" dirty="0"/>
+                        <a:t>Plug-In</a:t>
+                      </a:r>
+                    </a:p>
+                  </a:txBody>
+                  <a:tcPr>
+                    <a:solidFill>
+                      <a:schemeClr val="bg2"/>
+                    </a:solidFill>
+                  </a:tcPr>
+                </a:tc>
+                <a:tc>
+                  <a:txBody>
+                    <a:bodyPr/>
+                    <a:lstStyle/>
+                    <a:p>
+                      <a:pPr marL="285750" indent="-285750">
+                        <a:buFont typeface="Arial" panose="020B0604020202020204" pitchFamily="34" charset="0"/>
+                        <a:buChar char="•"/>
+                      </a:pPr>
+                      <a:r>
+                        <a:rPr lang="en-US" sz="1600" dirty="0"/>
+                        <a:t>typically better integrated into the Jira UI</a:t>
+                      </a:r>
+                    </a:p>
+                    <a:p>
+                      <a:pPr marL="285750" indent="-285750">
+                        <a:buFont typeface="Arial" panose="020B0604020202020204" pitchFamily="34" charset="0"/>
+                        <a:buChar char="•"/>
+                      </a:pPr>
+                      <a:r>
+                        <a:rPr lang="en-US" sz="1600" dirty="0"/>
+                        <a:t>repo indexing handled on Jira server side</a:t>
+                      </a:r>
+                    </a:p>
+                    <a:p>
+                      <a:pPr marL="285750" indent="-285750">
+                        <a:buFont typeface="Arial" panose="020B0604020202020204" pitchFamily="34" charset="0"/>
+                        <a:buChar char="•"/>
+                      </a:pPr>
+                      <a:r>
+                        <a:rPr lang="en-US" sz="1600" dirty="0"/>
+                        <a:t>can use Jira permissions to control actions</a:t>
+                      </a:r>
+                    </a:p>
+                    <a:p>
+                      <a:pPr marL="285750" indent="-285750">
+                        <a:buFont typeface="Arial" panose="020B0604020202020204" pitchFamily="34" charset="0"/>
+                        <a:buChar char="•"/>
+                      </a:pPr>
+                      <a:r>
+                        <a:rPr lang="en-US" sz="1600" dirty="0"/>
+                        <a:t>may be easier to support different Git incarnations</a:t>
+                      </a:r>
+                    </a:p>
+                    <a:p>
+                      <a:pPr marL="285750" indent="-285750">
+                        <a:buFont typeface="Arial" panose="020B0604020202020204" pitchFamily="34" charset="0"/>
+                        <a:buChar char="•"/>
+                      </a:pPr>
+                      <a:r>
+                        <a:rPr lang="en-US" sz="1600" dirty="0"/>
+                        <a:t>Vendor support</a:t>
+                      </a:r>
+                    </a:p>
+                  </a:txBody>
+                  <a:tcPr>
+                    <a:solidFill>
+                      <a:schemeClr val="bg2"/>
+                    </a:solidFill>
+                  </a:tcPr>
+                </a:tc>
+                <a:tc>
+                  <a:txBody>
+                    <a:bodyPr/>
+                    <a:lstStyle/>
+                    <a:p>
+                      <a:pPr marL="285750" indent="-285750">
+                        <a:buFont typeface="Arial" panose="020B0604020202020204" pitchFamily="34" charset="0"/>
+                        <a:buChar char="•"/>
+                      </a:pPr>
+                      <a:r>
+                        <a:rPr lang="en-US" sz="1600" dirty="0"/>
+                        <a:t>license cost</a:t>
+                      </a:r>
+                    </a:p>
+                    <a:p>
+                      <a:pPr marL="285750" indent="-285750">
+                        <a:buFont typeface="Arial" panose="020B0604020202020204" pitchFamily="34" charset="0"/>
+                        <a:buChar char="•"/>
+                      </a:pPr>
+                      <a:r>
+                        <a:rPr lang="en-US" sz="1600" dirty="0"/>
+                        <a:t>stability concerns?</a:t>
+                      </a:r>
+                    </a:p>
+                    <a:p>
+                      <a:pPr marL="285750" indent="-285750">
+                        <a:buFont typeface="Arial" panose="020B0604020202020204" pitchFamily="34" charset="0"/>
+                        <a:buChar char="•"/>
+                      </a:pPr>
+                      <a:r>
+                        <a:rPr lang="en-US" sz="1600" dirty="0"/>
+                        <a:t>admin friction/elevated rights/migrations/testing</a:t>
+                      </a:r>
+                    </a:p>
+                    <a:p>
+                      <a:pPr marL="285750" indent="-285750">
+                        <a:buFont typeface="Arial" panose="020B0604020202020204" pitchFamily="34" charset="0"/>
+                        <a:buChar char="•"/>
+                      </a:pPr>
+                      <a:r>
+                        <a:rPr lang="en-US" sz="1600" dirty="0"/>
+                        <a:t>can change Jira settings + add custom fields</a:t>
+                      </a:r>
+                    </a:p>
+                  </a:txBody>
+                  <a:tcPr>
+                    <a:solidFill>
+                      <a:schemeClr val="bg2"/>
+                    </a:solidFill>
+                  </a:tcPr>
+                </a:tc>
+                <a:extLst>
+                  <a:ext uri="{0D108BD9-81ED-4DB2-BD59-A6C34878D82A}">
+                    <a16:rowId xmlns:a16="http://schemas.microsoft.com/office/drawing/2014/main" val="96383895"/>
+                  </a:ext>
+                </a:extLst>
+              </a:tr>
+              <a:tr h="1607472">
+                <a:tc>
+                  <a:txBody>
+                    <a:bodyPr/>
+                    <a:lstStyle/>
+                    <a:p>
+                      <a:endParaRPr lang="en-US" dirty="0"/>
+                    </a:p>
+                    <a:p>
+                      <a:endParaRPr lang="en-US" dirty="0"/>
+                    </a:p>
+                    <a:p>
+                      <a:r>
+                        <a:rPr lang="en-US" dirty="0"/>
+                        <a:t>Script</a:t>
+                      </a:r>
+                    </a:p>
+                  </a:txBody>
+                  <a:tcPr>
+                    <a:solidFill>
+                      <a:schemeClr val="bg2"/>
+                    </a:solidFill>
+                  </a:tcPr>
+                </a:tc>
+                <a:tc>
+                  <a:txBody>
+                    <a:bodyPr/>
+                    <a:lstStyle/>
+                    <a:p>
+                      <a:pPr marL="285750" indent="-285750">
+                        <a:buFont typeface="Arial" panose="020B0604020202020204" pitchFamily="34" charset="0"/>
+                        <a:buChar char="•"/>
+                      </a:pPr>
+                      <a:r>
+                        <a:rPr lang="en-US" sz="1600" dirty="0"/>
+                        <a:t>no license cost (!= free)</a:t>
+                      </a:r>
+                    </a:p>
+                    <a:p>
+                      <a:pPr marL="285750" indent="-285750">
+                        <a:buFont typeface="Arial" panose="020B0604020202020204" pitchFamily="34" charset="0"/>
+                        <a:buChar char="•"/>
+                      </a:pPr>
+                      <a:r>
+                        <a:rPr lang="en-US" sz="1600" dirty="0"/>
+                        <a:t>stability not a big concern</a:t>
+                      </a:r>
+                    </a:p>
+                    <a:p>
+                      <a:pPr marL="285750" indent="-285750">
+                        <a:buFont typeface="Arial" panose="020B0604020202020204" pitchFamily="34" charset="0"/>
+                        <a:buChar char="•"/>
+                      </a:pPr>
+                      <a:r>
+                        <a:rPr lang="en-US" sz="1600" dirty="0"/>
+                        <a:t>no admin friction</a:t>
+                      </a:r>
+                    </a:p>
+                    <a:p>
+                      <a:pPr marL="285750" indent="-285750">
+                        <a:buFont typeface="Arial" panose="020B0604020202020204" pitchFamily="34" charset="0"/>
+                        <a:buChar char="•"/>
+                      </a:pPr>
+                      <a:r>
+                        <a:rPr lang="en-US" sz="1600" dirty="0"/>
+                        <a:t>you can understand, change and extend what it does if you have the source</a:t>
+                      </a:r>
+                    </a:p>
+                  </a:txBody>
+                  <a:tcPr>
+                    <a:solidFill>
+                      <a:schemeClr val="bg2"/>
+                    </a:solidFill>
+                  </a:tcPr>
+                </a:tc>
+                <a:tc>
+                  <a:txBody>
+                    <a:bodyPr/>
+                    <a:lstStyle/>
+                    <a:p>
+                      <a:pPr marL="285750" indent="-285750">
+                        <a:buFont typeface="Arial" panose="020B0604020202020204" pitchFamily="34" charset="0"/>
+                        <a:buChar char="•"/>
+                      </a:pPr>
+                      <a:r>
+                        <a:rPr lang="en-US" sz="1600" dirty="0"/>
+                        <a:t>no paid support</a:t>
+                      </a:r>
+                    </a:p>
+                    <a:p>
+                      <a:pPr marL="285750" indent="-285750">
+                        <a:buFont typeface="Arial" panose="020B0604020202020204" pitchFamily="34" charset="0"/>
+                        <a:buChar char="•"/>
+                      </a:pPr>
+                      <a:r>
+                        <a:rPr lang="en-US" sz="1600" dirty="0"/>
+                        <a:t>no permissions model</a:t>
+                      </a:r>
+                    </a:p>
+                    <a:p>
+                      <a:pPr marL="285750" indent="-285750">
+                        <a:buFont typeface="Arial" panose="020B0604020202020204" pitchFamily="34" charset="0"/>
+                        <a:buChar char="•"/>
+                      </a:pPr>
+                      <a:r>
+                        <a:rPr lang="en-US" sz="1600" dirty="0"/>
+                        <a:t>Less well-integrated into Jira UI</a:t>
+                      </a:r>
+                    </a:p>
+                    <a:p>
+                      <a:pPr marL="285750" indent="-285750">
+                        <a:buFont typeface="Arial" panose="020B0604020202020204" pitchFamily="34" charset="0"/>
+                        <a:buChar char="•"/>
+                      </a:pPr>
+                      <a:r>
+                        <a:rPr lang="en-US" sz="1600" dirty="0"/>
+                        <a:t>need to rack up and run yourself</a:t>
+                      </a:r>
+                    </a:p>
+                  </a:txBody>
+                  <a:tcPr>
+                    <a:solidFill>
+                      <a:schemeClr val="bg2"/>
+                    </a:solidFill>
+                  </a:tcPr>
+                </a:tc>
+                <a:extLst>
+                  <a:ext uri="{0D108BD9-81ED-4DB2-BD59-A6C34878D82A}">
+                    <a16:rowId xmlns:a16="http://schemas.microsoft.com/office/drawing/2014/main" val="197393616"/>
+                  </a:ext>
+                </a:extLst>
+              </a:tr>
+            </a:tbl>
+          </a:graphicData>
+        </a:graphic>
+      </p:graphicFrame>
+    </p:spTree>
+    <p:extLst>
+      <p:ext uri="{BB962C8B-B14F-4D97-AF65-F5344CB8AC3E}">
+        <p14:creationId xmlns:p14="http://schemas.microsoft.com/office/powerpoint/2010/main" val="1482377201"/>
+      </p:ext>
+    </p:extLst>
+  </p:cSld>
+  <p:clrMapOvr>
+    <a:masterClrMapping/>
+  </p:clrMapOvr>
+</p:sld>
+</file>
+
+<file path=ppt/slides/slide6.xml><?xml version="1.0" encoding="utf-8"?>
+<p:sld xmlns:a="http://schemas.openxmlformats.org/drawingml/2006/main" xmlns:r="http://schemas.openxmlformats.org/officeDocument/2006/relationships" xmlns:p="http://schemas.openxmlformats.org/presentationml/2006/main">
+  <p:cSld>
+    <p:bg>
+      <p:bgPr>
+        <a:solidFill>
+          <a:schemeClr val="accent1">
+            <a:lumMod val="20000"/>
+            <a:lumOff val="80000"/>
+          </a:schemeClr>
+        </a:solidFill>
+        <a:effectLst/>
+      </p:bgPr>
+    </p:bg>
+    <p:spTree>
+      <p:nvGrpSpPr>
+        <p:cNvPr id="1" name=""/>
+        <p:cNvGrpSpPr/>
+        <p:nvPr/>
+      </p:nvGrpSpPr>
+      <p:grpSpPr>
+        <a:xfrm>
+          <a:off x="0" y="0"/>
+          <a:ext cx="0" cy="0"/>
+          <a:chOff x="0" y="0"/>
+          <a:chExt cx="0" cy="0"/>
+        </a:xfrm>
+      </p:grpSpPr>
+      <p:sp>
+        <p:nvSpPr>
+          <p:cNvPr id="2" name="Title 1"/>
+          <p:cNvSpPr>
+            <a:spLocks noGrp="1"/>
+          </p:cNvSpPr>
+          <p:nvPr>
+            <p:ph type="title"/>
+          </p:nvPr>
+        </p:nvSpPr>
+        <p:spPr>
+          <a:xfrm>
+            <a:off x="457200" y="274638"/>
+            <a:ext cx="8229600" cy="1143000"/>
+          </a:xfrm>
+        </p:spPr>
+        <p:txBody>
+          <a:bodyPr>
+            <a:noAutofit/>
+          </a:bodyPr>
+          <a:lstStyle/>
+          <a:p>
+            <a:r>
+              <a:rPr lang="en-US" sz="3200" dirty="0"/>
+              <a:t>Git Integration for Jira from </a:t>
+            </a:r>
+            <a:r>
+              <a:rPr lang="en-US" sz="3200" dirty="0" err="1"/>
+              <a:t>BigBrassBand</a:t>
+            </a:r>
+            <a:br>
+              <a:rPr lang="en-US" sz="3200" dirty="0"/>
+            </a:br>
+            <a:r>
+              <a:rPr lang="en-US" sz="3200" dirty="0"/>
+              <a:t>Screen Shots</a:t>
+            </a:r>
+          </a:p>
+        </p:txBody>
+      </p:sp>
+      <p:sp>
+        <p:nvSpPr>
+          <p:cNvPr id="3" name="Content Placeholder 2"/>
+          <p:cNvSpPr>
+            <a:spLocks noGrp="1"/>
+          </p:cNvSpPr>
+          <p:nvPr>
+            <p:ph idx="1"/>
+          </p:nvPr>
+        </p:nvSpPr>
+        <p:spPr>
+          <a:xfrm>
+            <a:off x="457200" y="1600200"/>
+            <a:ext cx="8229600" cy="4800600"/>
+          </a:xfrm>
+        </p:spPr>
+        <p:txBody>
+          <a:bodyPr>
+            <a:noAutofit/>
+          </a:bodyPr>
+          <a:lstStyle/>
+          <a:p>
+            <a:pPr marL="365760">
+              <a:spcBef>
+                <a:spcPts val="0"/>
+              </a:spcBef>
+            </a:pPr>
+            <a:endParaRPr lang="en-US" sz="2800" dirty="0"/>
+          </a:p>
+        </p:txBody>
+      </p:sp>
+    </p:spTree>
+    <p:extLst>
+      <p:ext uri="{BB962C8B-B14F-4D97-AF65-F5344CB8AC3E}">
+        <p14:creationId xmlns:p14="http://schemas.microsoft.com/office/powerpoint/2010/main" val="142049666"/>
+      </p:ext>
+    </p:extLst>
+  </p:cSld>
+  <p:clrMapOvr>
+    <a:masterClrMapping/>
+  </p:clrMapOvr>
+</p:sld>
+</file>
+
+<file path=ppt/slides/slide7.xml><?xml version="1.0" encoding="utf-8"?>
+<p:sld xmlns:a="http://schemas.openxmlformats.org/drawingml/2006/main" xmlns:r="http://schemas.openxmlformats.org/officeDocument/2006/relationships" xmlns:p="http://schemas.openxmlformats.org/presentationml/2006/main">
+  <p:cSld>
+    <p:bg>
+      <p:bgPr>
+        <a:solidFill>
+          <a:schemeClr val="accent1">
+            <a:lumMod val="20000"/>
+            <a:lumOff val="80000"/>
+          </a:schemeClr>
+        </a:solidFill>
+        <a:effectLst/>
+      </p:bgPr>
+    </p:bg>
+    <p:spTree>
+      <p:nvGrpSpPr>
+        <p:cNvPr id="1" name=""/>
+        <p:cNvGrpSpPr/>
+        <p:nvPr/>
+      </p:nvGrpSpPr>
+      <p:grpSpPr>
+        <a:xfrm>
+          <a:off x="0" y="0"/>
+          <a:ext cx="0" cy="0"/>
+          <a:chOff x="0" y="0"/>
+          <a:chExt cx="0" cy="0"/>
+        </a:xfrm>
+      </p:grpSpPr>
+      <p:sp>
+        <p:nvSpPr>
+          <p:cNvPr id="2" name="Title 1"/>
+          <p:cNvSpPr>
+            <a:spLocks noGrp="1"/>
+          </p:cNvSpPr>
+          <p:nvPr>
+            <p:ph type="title"/>
+          </p:nvPr>
+        </p:nvSpPr>
+        <p:spPr>
+          <a:xfrm>
+            <a:off x="457200" y="274638"/>
+            <a:ext cx="8229600" cy="1143000"/>
+          </a:xfrm>
+        </p:spPr>
+        <p:txBody>
+          <a:bodyPr>
+            <a:noAutofit/>
+          </a:bodyPr>
+          <a:lstStyle/>
+          <a:p>
+            <a:r>
+              <a:rPr lang="en-US" sz="3200" dirty="0"/>
+              <a:t>http://github.com/bobk/jiragithub</a:t>
+            </a:r>
+            <a:br>
+              <a:rPr lang="en-US" sz="3200" dirty="0"/>
+            </a:br>
+            <a:r>
+              <a:rPr lang="en-US" sz="3200" dirty="0"/>
+              <a:t>Screen Shots</a:t>
+            </a:r>
+          </a:p>
+        </p:txBody>
+      </p:sp>
+      <p:sp>
+        <p:nvSpPr>
+          <p:cNvPr id="3" name="Content Placeholder 2"/>
+          <p:cNvSpPr>
+            <a:spLocks noGrp="1"/>
+          </p:cNvSpPr>
+          <p:nvPr>
+            <p:ph idx="1"/>
+          </p:nvPr>
+        </p:nvSpPr>
+        <p:spPr>
+          <a:xfrm>
+            <a:off x="457200" y="1600200"/>
+            <a:ext cx="8229600" cy="4800600"/>
+          </a:xfrm>
+        </p:spPr>
+        <p:txBody>
+          <a:bodyPr>
+            <a:noAutofit/>
+          </a:bodyPr>
+          <a:lstStyle/>
+          <a:p>
+            <a:pPr marL="365760">
+              <a:spcBef>
+                <a:spcPts val="0"/>
+              </a:spcBef>
+            </a:pPr>
+            <a:endParaRPr lang="en-US" sz="2800" dirty="0"/>
+          </a:p>
+        </p:txBody>
+      </p:sp>
+    </p:spTree>
+    <p:extLst>
+      <p:ext uri="{BB962C8B-B14F-4D97-AF65-F5344CB8AC3E}">
+        <p14:creationId xmlns:p14="http://schemas.microsoft.com/office/powerpoint/2010/main" val="1008999639"/>
+      </p:ext>
+    </p:extLst>
+  </p:cSld>
+  <p:clrMapOvr>
+    <a:masterClrMapping/>
+  </p:clrMapOvr>
+</p:sld>
+</file>
+
+<file path=ppt/slides/slide8.xml><?xml version="1.0" encoding="utf-8"?>
 <p:sld xmlns:a="http://schemas.openxmlformats.org/drawingml/2006/main" xmlns:r="http://schemas.openxmlformats.org/officeDocument/2006/relationships" xmlns:p="http://schemas.openxmlformats.org/presentationml/2006/main">
   <p:cSld>
     <p:bg>
@@ -3855,7 +4849,7 @@
 </p:sld>
 </file>
 
-<file path=ppt/slides/slide5.xml><?xml version="1.0" encoding="utf-8"?>
+<file path=ppt/slides/slide9.xml><?xml version="1.0" encoding="utf-8"?>
 <p:sld xmlns:a="http://schemas.openxmlformats.org/drawingml/2006/main" xmlns:r="http://schemas.openxmlformats.org/officeDocument/2006/relationships" xmlns:p="http://schemas.openxmlformats.org/presentationml/2006/main">
   <p:cSld>
     <p:bg>
@@ -3929,7 +4923,7 @@
           <a:p>
             <a:r>
               <a:rPr lang="en-US" dirty="0"/>
-              <a:t>Issue Collectors and what to use them for</a:t>
+              <a:t>Jira Issue Collectors and what to use them for</a:t>
             </a:r>
           </a:p>
           <a:p>

</xml_diff>

<commit_message>
JIRAGITHUB-6 more updates for new jiragithub code
</commit_message>
<xml_diff>
--- a/Git Integration Options for Jira.pptx
+++ b/Git Integration Options for Jira.pptx
@@ -312,7 +312,7 @@
           <a:p>
             <a:fld id="{799B01D3-E541-42FD-B1E6-9E7097F8E480}" type="datetimeFigureOut">
               <a:rPr lang="en-US" smtClean="0"/>
-              <a:t>3/1/2020</a:t>
+              <a:t>3/7/2020</a:t>
             </a:fld>
             <a:endParaRPr lang="en-US"/>
           </a:p>
@@ -480,7 +480,7 @@
           <a:p>
             <a:fld id="{799B01D3-E541-42FD-B1E6-9E7097F8E480}" type="datetimeFigureOut">
               <a:rPr lang="en-US" smtClean="0"/>
-              <a:t>3/1/2020</a:t>
+              <a:t>3/7/2020</a:t>
             </a:fld>
             <a:endParaRPr lang="en-US"/>
           </a:p>
@@ -658,7 +658,7 @@
           <a:p>
             <a:fld id="{799B01D3-E541-42FD-B1E6-9E7097F8E480}" type="datetimeFigureOut">
               <a:rPr lang="en-US" smtClean="0"/>
-              <a:t>3/1/2020</a:t>
+              <a:t>3/7/2020</a:t>
             </a:fld>
             <a:endParaRPr lang="en-US"/>
           </a:p>
@@ -810,7 +810,7 @@
           <a:p>
             <a:fld id="{799B01D3-E541-42FD-B1E6-9E7097F8E480}" type="datetimeFigureOut">
               <a:rPr lang="en-US" smtClean="0"/>
-              <a:t>3/1/2020</a:t>
+              <a:t>3/7/2020</a:t>
             </a:fld>
             <a:endParaRPr lang="en-US"/>
           </a:p>
@@ -1095,7 +1095,7 @@
           <a:p>
             <a:fld id="{799B01D3-E541-42FD-B1E6-9E7097F8E480}" type="datetimeFigureOut">
               <a:rPr lang="en-US" smtClean="0"/>
-              <a:t>3/1/2020</a:t>
+              <a:t>3/7/2020</a:t>
             </a:fld>
             <a:endParaRPr lang="en-US"/>
           </a:p>
@@ -1380,7 +1380,7 @@
           <a:p>
             <a:fld id="{799B01D3-E541-42FD-B1E6-9E7097F8E480}" type="datetimeFigureOut">
               <a:rPr lang="en-US" smtClean="0"/>
-              <a:t>3/1/2020</a:t>
+              <a:t>3/7/2020</a:t>
             </a:fld>
             <a:endParaRPr lang="en-US"/>
           </a:p>
@@ -1799,7 +1799,7 @@
           <a:p>
             <a:fld id="{799B01D3-E541-42FD-B1E6-9E7097F8E480}" type="datetimeFigureOut">
               <a:rPr lang="en-US" smtClean="0"/>
-              <a:t>3/1/2020</a:t>
+              <a:t>3/7/2020</a:t>
             </a:fld>
             <a:endParaRPr lang="en-US"/>
           </a:p>
@@ -1916,7 +1916,7 @@
           <a:p>
             <a:fld id="{799B01D3-E541-42FD-B1E6-9E7097F8E480}" type="datetimeFigureOut">
               <a:rPr lang="en-US" smtClean="0"/>
-              <a:t>3/1/2020</a:t>
+              <a:t>3/7/2020</a:t>
             </a:fld>
             <a:endParaRPr lang="en-US"/>
           </a:p>
@@ -2011,7 +2011,7 @@
           <a:p>
             <a:fld id="{799B01D3-E541-42FD-B1E6-9E7097F8E480}" type="datetimeFigureOut">
               <a:rPr lang="en-US" smtClean="0"/>
-              <a:t>3/1/2020</a:t>
+              <a:t>3/7/2020</a:t>
             </a:fld>
             <a:endParaRPr lang="en-US"/>
           </a:p>
@@ -2286,7 +2286,7 @@
           <a:p>
             <a:fld id="{799B01D3-E541-42FD-B1E6-9E7097F8E480}" type="datetimeFigureOut">
               <a:rPr lang="en-US" smtClean="0"/>
-              <a:t>3/1/2020</a:t>
+              <a:t>3/7/2020</a:t>
             </a:fld>
             <a:endParaRPr lang="en-US"/>
           </a:p>
@@ -2538,7 +2538,7 @@
           <a:p>
             <a:fld id="{799B01D3-E541-42FD-B1E6-9E7097F8E480}" type="datetimeFigureOut">
               <a:rPr lang="en-US" smtClean="0"/>
-              <a:t>3/1/2020</a:t>
+              <a:t>3/7/2020</a:t>
             </a:fld>
             <a:endParaRPr lang="en-US"/>
           </a:p>
@@ -2749,7 +2749,7 @@
           <a:p>
             <a:fld id="{799B01D3-E541-42FD-B1E6-9E7097F8E480}" type="datetimeFigureOut">
               <a:rPr lang="en-US" smtClean="0"/>
-              <a:t>3/1/2020</a:t>
+              <a:t>3/7/2020</a:t>
             </a:fld>
             <a:endParaRPr lang="en-US"/>
           </a:p>
@@ -5924,10 +5924,10 @@
       </p:sp>
       <p:pic>
         <p:nvPicPr>
-          <p:cNvPr id="5" name="Picture 4">
+          <p:cNvPr id="3" name="Picture 2">
             <a:extLst>
               <a:ext uri="{FF2B5EF4-FFF2-40B4-BE49-F238E27FC236}">
-                <a16:creationId xmlns:a16="http://schemas.microsoft.com/office/drawing/2014/main" id="{5399D57B-BB46-4E98-B36C-C665CF11BC3D}"/>
+                <a16:creationId xmlns:a16="http://schemas.microsoft.com/office/drawing/2014/main" id="{B99323AC-8AA7-40F7-95C7-CFF757FB8D11}"/>
               </a:ext>
             </a:extLst>
           </p:cNvPr>
@@ -5944,8 +5944,8 @@
         </p:blipFill>
         <p:spPr>
           <a:xfrm>
-            <a:off x="152400" y="1385207"/>
-            <a:ext cx="8763000" cy="5320393"/>
+            <a:off x="228600" y="1318748"/>
+            <a:ext cx="8763000" cy="5386852"/>
           </a:xfrm>
           <a:prstGeom prst="rect">
             <a:avLst/>
@@ -6307,10 +6307,10 @@
       </p:sp>
       <p:pic>
         <p:nvPicPr>
-          <p:cNvPr id="4" name="Picture 3">
+          <p:cNvPr id="6" name="Picture 5">
             <a:extLst>
               <a:ext uri="{FF2B5EF4-FFF2-40B4-BE49-F238E27FC236}">
-                <a16:creationId xmlns:a16="http://schemas.microsoft.com/office/drawing/2014/main" id="{7F657DDA-42CB-40FF-9700-8B4912B0DAD7}"/>
+                <a16:creationId xmlns:a16="http://schemas.microsoft.com/office/drawing/2014/main" id="{8EDA38BE-CD75-48B0-A64D-9791F6B3CD5A}"/>
               </a:ext>
             </a:extLst>
           </p:cNvPr>
@@ -6327,8 +6327,8 @@
         </p:blipFill>
         <p:spPr>
           <a:xfrm>
-            <a:off x="271462" y="1467379"/>
-            <a:ext cx="8601075" cy="5124450"/>
+            <a:off x="76200" y="1662228"/>
+            <a:ext cx="8915400" cy="5119572"/>
           </a:xfrm>
           <a:prstGeom prst="rect">
             <a:avLst/>
@@ -6562,12 +6562,12 @@
               </a:spcBef>
             </a:pPr>
             <a:r>
-              <a:rPr lang="en-US" sz="2000" dirty="0">
+              <a:rPr lang="en-US" sz="2000" b="1" dirty="0">
                 <a:solidFill>
                   <a:srgbClr val="00B050"/>
                 </a:solidFill>
               </a:rPr>
-              <a:t>Don’t like the way it works? Fork it and change it!</a:t>
+              <a:t>Want a feature to work differently? Change it yourself!</a:t>
             </a:r>
           </a:p>
           <a:p>
@@ -6604,10 +6604,11 @@
             </a:endParaRPr>
           </a:p>
           <a:p>
-            <a:pPr marL="365760">
+            <a:pPr marL="22860" indent="0">
               <a:spcBef>
                 <a:spcPts val="0"/>
               </a:spcBef>
+              <a:buNone/>
             </a:pPr>
             <a:endParaRPr lang="en-US" sz="2000" dirty="0">
               <a:solidFill>

</xml_diff>

<commit_message>
JIRAGITHUB-7 small changes for Mar 25
</commit_message>
<xml_diff>
--- a/Git Integration Options for Jira.pptx
+++ b/Git Integration Options for Jira.pptx
@@ -10,12 +10,13 @@
     <p:sldId id="272" r:id="rId4"/>
     <p:sldId id="273" r:id="rId5"/>
     <p:sldId id="274" r:id="rId6"/>
-    <p:sldId id="275" r:id="rId7"/>
-    <p:sldId id="277" r:id="rId8"/>
-    <p:sldId id="276" r:id="rId9"/>
-    <p:sldId id="279" r:id="rId10"/>
-    <p:sldId id="260" r:id="rId11"/>
-    <p:sldId id="265" r:id="rId12"/>
+    <p:sldId id="280" r:id="rId7"/>
+    <p:sldId id="275" r:id="rId8"/>
+    <p:sldId id="277" r:id="rId9"/>
+    <p:sldId id="276" r:id="rId10"/>
+    <p:sldId id="279" r:id="rId11"/>
+    <p:sldId id="260" r:id="rId12"/>
+    <p:sldId id="265" r:id="rId13"/>
   </p:sldIdLst>
   <p:sldSz cx="9144000" cy="6858000" type="screen4x3"/>
   <p:notesSz cx="6858000" cy="9144000"/>
@@ -312,7 +313,7 @@
           <a:p>
             <a:fld id="{799B01D3-E541-42FD-B1E6-9E7097F8E480}" type="datetimeFigureOut">
               <a:rPr lang="en-US" smtClean="0"/>
-              <a:t>3/7/2020</a:t>
+              <a:t>3/22/2020</a:t>
             </a:fld>
             <a:endParaRPr lang="en-US"/>
           </a:p>
@@ -480,7 +481,7 @@
           <a:p>
             <a:fld id="{799B01D3-E541-42FD-B1E6-9E7097F8E480}" type="datetimeFigureOut">
               <a:rPr lang="en-US" smtClean="0"/>
-              <a:t>3/7/2020</a:t>
+              <a:t>3/22/2020</a:t>
             </a:fld>
             <a:endParaRPr lang="en-US"/>
           </a:p>
@@ -658,7 +659,7 @@
           <a:p>
             <a:fld id="{799B01D3-E541-42FD-B1E6-9E7097F8E480}" type="datetimeFigureOut">
               <a:rPr lang="en-US" smtClean="0"/>
-              <a:t>3/7/2020</a:t>
+              <a:t>3/22/2020</a:t>
             </a:fld>
             <a:endParaRPr lang="en-US"/>
           </a:p>
@@ -810,7 +811,7 @@
           <a:p>
             <a:fld id="{799B01D3-E541-42FD-B1E6-9E7097F8E480}" type="datetimeFigureOut">
               <a:rPr lang="en-US" smtClean="0"/>
-              <a:t>3/7/2020</a:t>
+              <a:t>3/22/2020</a:t>
             </a:fld>
             <a:endParaRPr lang="en-US"/>
           </a:p>
@@ -1095,7 +1096,7 @@
           <a:p>
             <a:fld id="{799B01D3-E541-42FD-B1E6-9E7097F8E480}" type="datetimeFigureOut">
               <a:rPr lang="en-US" smtClean="0"/>
-              <a:t>3/7/2020</a:t>
+              <a:t>3/22/2020</a:t>
             </a:fld>
             <a:endParaRPr lang="en-US"/>
           </a:p>
@@ -1380,7 +1381,7 @@
           <a:p>
             <a:fld id="{799B01D3-E541-42FD-B1E6-9E7097F8E480}" type="datetimeFigureOut">
               <a:rPr lang="en-US" smtClean="0"/>
-              <a:t>3/7/2020</a:t>
+              <a:t>3/22/2020</a:t>
             </a:fld>
             <a:endParaRPr lang="en-US"/>
           </a:p>
@@ -1799,7 +1800,7 @@
           <a:p>
             <a:fld id="{799B01D3-E541-42FD-B1E6-9E7097F8E480}" type="datetimeFigureOut">
               <a:rPr lang="en-US" smtClean="0"/>
-              <a:t>3/7/2020</a:t>
+              <a:t>3/22/2020</a:t>
             </a:fld>
             <a:endParaRPr lang="en-US"/>
           </a:p>
@@ -1916,7 +1917,7 @@
           <a:p>
             <a:fld id="{799B01D3-E541-42FD-B1E6-9E7097F8E480}" type="datetimeFigureOut">
               <a:rPr lang="en-US" smtClean="0"/>
-              <a:t>3/7/2020</a:t>
+              <a:t>3/22/2020</a:t>
             </a:fld>
             <a:endParaRPr lang="en-US"/>
           </a:p>
@@ -2011,7 +2012,7 @@
           <a:p>
             <a:fld id="{799B01D3-E541-42FD-B1E6-9E7097F8E480}" type="datetimeFigureOut">
               <a:rPr lang="en-US" smtClean="0"/>
-              <a:t>3/7/2020</a:t>
+              <a:t>3/22/2020</a:t>
             </a:fld>
             <a:endParaRPr lang="en-US"/>
           </a:p>
@@ -2286,7 +2287,7 @@
           <a:p>
             <a:fld id="{799B01D3-E541-42FD-B1E6-9E7097F8E480}" type="datetimeFigureOut">
               <a:rPr lang="en-US" smtClean="0"/>
-              <a:t>3/7/2020</a:t>
+              <a:t>3/22/2020</a:t>
             </a:fld>
             <a:endParaRPr lang="en-US"/>
           </a:p>
@@ -2538,7 +2539,7 @@
           <a:p>
             <a:fld id="{799B01D3-E541-42FD-B1E6-9E7097F8E480}" type="datetimeFigureOut">
               <a:rPr lang="en-US" smtClean="0"/>
-              <a:t>3/7/2020</a:t>
+              <a:t>3/22/2020</a:t>
             </a:fld>
             <a:endParaRPr lang="en-US"/>
           </a:p>
@@ -2749,7 +2750,7 @@
           <a:p>
             <a:fld id="{799B01D3-E541-42FD-B1E6-9E7097F8E480}" type="datetimeFigureOut">
               <a:rPr lang="en-US" smtClean="0"/>
-              <a:t>3/7/2020</a:t>
+              <a:t>3/22/2020</a:t>
             </a:fld>
             <a:endParaRPr lang="en-US"/>
           </a:p>
@@ -3267,16 +3268,19 @@
           </a:p>
           <a:p>
             <a:r>
-              <a:rPr lang="en-US" sz="2600" b="1" dirty="0"/>
-              <a:t>Lightning Talk – Mar 25, 2020 (add link here)</a:t>
-            </a:r>
+              <a:rPr lang="en-US" sz="2600" b="1" dirty="0">
+                <a:hlinkClick r:id="rId3"/>
+              </a:rPr>
+              <a:t>Online Lean/Agile Lightning Talk – Mar 25, 2020</a:t>
+            </a:r>
+            <a:endParaRPr lang="en-US" sz="2600" b="1" dirty="0"/>
           </a:p>
           <a:p>
             <a:endParaRPr lang="en-US" dirty="0"/>
           </a:p>
           <a:p>
             <a:r>
-              <a:rPr lang="en-US" sz="2600" dirty="0">
+              <a:rPr lang="en-US" sz="2400" dirty="0">
                 <a:solidFill>
                   <a:schemeClr val="tx1"/>
                 </a:solidFill>
@@ -3284,16 +3288,16 @@
               <a:t>Bob Kozlowski - </a:t>
             </a:r>
             <a:r>
-              <a:rPr lang="en-US" sz="2600" dirty="0">
-                <a:hlinkClick r:id="rId3"/>
+              <a:rPr lang="en-US" sz="2400" dirty="0">
+                <a:hlinkClick r:id="rId4"/>
               </a:rPr>
               <a:t>http://www.robertkozlowski.com</a:t>
             </a:r>
-            <a:endParaRPr lang="en-US" sz="2600" dirty="0"/>
-          </a:p>
-          <a:p>
-            <a:r>
-              <a:rPr lang="en-US" sz="2000" dirty="0">
+            <a:endParaRPr lang="en-US" sz="2400" dirty="0"/>
+          </a:p>
+          <a:p>
+            <a:r>
+              <a:rPr lang="en-US" sz="1800" dirty="0">
                 <a:solidFill>
                   <a:schemeClr val="tx1"/>
                 </a:solidFill>
@@ -3303,7 +3307,7 @@
           </a:p>
           <a:p>
             <a:r>
-              <a:rPr lang="en-US" sz="2000" dirty="0">
+              <a:rPr lang="en-US" sz="1800" dirty="0">
                 <a:solidFill>
                   <a:schemeClr val="tx1"/>
                 </a:solidFill>
@@ -3313,14 +3317,14 @@
           </a:p>
           <a:p>
             <a:r>
-              <a:rPr lang="en-US" sz="1900" b="1" dirty="0">
+              <a:rPr lang="en-US" sz="1800" b="1" dirty="0">
                 <a:solidFill>
                   <a:schemeClr val="tx1"/>
                 </a:solidFill>
               </a:rPr>
               <a:t> available Apr 2020 for next contracting/advisory role</a:t>
             </a:r>
-            <a:endParaRPr lang="en-US" sz="3800" b="1" dirty="0">
+            <a:endParaRPr lang="en-US" sz="3600" b="1" dirty="0">
               <a:solidFill>
                 <a:schemeClr val="tx1"/>
               </a:solidFill>
@@ -3342,6 +3346,289 @@
 </file>
 
 <file path=ppt/slides/slide10.xml><?xml version="1.0" encoding="utf-8"?>
+<p:sld xmlns:a="http://schemas.openxmlformats.org/drawingml/2006/main" xmlns:r="http://schemas.openxmlformats.org/officeDocument/2006/relationships" xmlns:p="http://schemas.openxmlformats.org/presentationml/2006/main">
+  <p:cSld>
+    <p:bg>
+      <p:bgPr>
+        <a:solidFill>
+          <a:schemeClr val="accent1">
+            <a:lumMod val="20000"/>
+            <a:lumOff val="80000"/>
+          </a:schemeClr>
+        </a:solidFill>
+        <a:effectLst/>
+      </p:bgPr>
+    </p:bg>
+    <p:spTree>
+      <p:nvGrpSpPr>
+        <p:cNvPr id="1" name=""/>
+        <p:cNvGrpSpPr/>
+        <p:nvPr/>
+      </p:nvGrpSpPr>
+      <p:grpSpPr>
+        <a:xfrm>
+          <a:off x="0" y="0"/>
+          <a:ext cx="0" cy="0"/>
+          <a:chOff x="0" y="0"/>
+          <a:chExt cx="0" cy="0"/>
+        </a:xfrm>
+      </p:grpSpPr>
+      <p:sp>
+        <p:nvSpPr>
+          <p:cNvPr id="2" name="Title 1"/>
+          <p:cNvSpPr>
+            <a:spLocks noGrp="1"/>
+          </p:cNvSpPr>
+          <p:nvPr>
+            <p:ph type="title"/>
+          </p:nvPr>
+        </p:nvSpPr>
+        <p:spPr>
+          <a:xfrm>
+            <a:off x="457200" y="274638"/>
+            <a:ext cx="8229600" cy="1143000"/>
+          </a:xfrm>
+        </p:spPr>
+        <p:txBody>
+          <a:bodyPr>
+            <a:noAutofit/>
+          </a:bodyPr>
+          <a:lstStyle/>
+          <a:p>
+            <a:r>
+              <a:rPr lang="en-US" sz="2800" b="1" dirty="0" err="1"/>
+              <a:t>jiragithub</a:t>
+            </a:r>
+            <a:r>
+              <a:rPr lang="en-US" sz="2800" dirty="0"/>
+              <a:t> script</a:t>
+            </a:r>
+            <a:br>
+              <a:rPr lang="en-US" sz="2800" dirty="0"/>
+            </a:br>
+            <a:r>
+              <a:rPr lang="en-US" sz="2800" dirty="0"/>
+              <a:t>Features</a:t>
+            </a:r>
+          </a:p>
+        </p:txBody>
+      </p:sp>
+      <p:sp>
+        <p:nvSpPr>
+          <p:cNvPr id="4" name="Content Placeholder 2">
+            <a:extLst>
+              <a:ext uri="{FF2B5EF4-FFF2-40B4-BE49-F238E27FC236}">
+                <a16:creationId xmlns:a16="http://schemas.microsoft.com/office/drawing/2014/main" id="{28AD2EA2-2568-4015-953C-72DE05BE5540}"/>
+              </a:ext>
+            </a:extLst>
+          </p:cNvPr>
+          <p:cNvSpPr>
+            <a:spLocks noGrp="1"/>
+          </p:cNvSpPr>
+          <p:nvPr>
+            <p:ph idx="1"/>
+          </p:nvPr>
+        </p:nvSpPr>
+        <p:spPr>
+          <a:xfrm>
+            <a:off x="304800" y="1600200"/>
+            <a:ext cx="8458200" cy="4983162"/>
+          </a:xfrm>
+        </p:spPr>
+        <p:txBody>
+          <a:bodyPr>
+            <a:noAutofit/>
+          </a:bodyPr>
+          <a:lstStyle/>
+          <a:p>
+            <a:pPr marL="365760">
+              <a:spcBef>
+                <a:spcPts val="0"/>
+              </a:spcBef>
+            </a:pPr>
+            <a:r>
+              <a:rPr lang="en-US" sz="2200" dirty="0"/>
+              <a:t>View Git commit/branch information in Jira</a:t>
+            </a:r>
+          </a:p>
+          <a:p>
+            <a:pPr marL="365760">
+              <a:spcBef>
+                <a:spcPts val="0"/>
+              </a:spcBef>
+            </a:pPr>
+            <a:r>
+              <a:rPr lang="en-US" sz="2200" dirty="0"/>
+              <a:t>Places Git commit information in Jira as comments (user-definable format)</a:t>
+            </a:r>
+          </a:p>
+          <a:p>
+            <a:pPr marL="365760">
+              <a:spcBef>
+                <a:spcPts val="0"/>
+              </a:spcBef>
+            </a:pPr>
+            <a:r>
+              <a:rPr lang="en-US" sz="2200" dirty="0"/>
+              <a:t>“Semi-Smart Commits” - transition + reassign issues via commit messages</a:t>
+            </a:r>
+          </a:p>
+          <a:p>
+            <a:pPr marL="365760">
+              <a:spcBef>
+                <a:spcPts val="0"/>
+              </a:spcBef>
+            </a:pPr>
+            <a:r>
+              <a:rPr lang="en-US" sz="2200" dirty="0"/>
+              <a:t>Also inserts direct links to branches and commits</a:t>
+            </a:r>
+          </a:p>
+          <a:p>
+            <a:pPr marL="365760">
+              <a:spcBef>
+                <a:spcPts val="0"/>
+              </a:spcBef>
+            </a:pPr>
+            <a:r>
+              <a:rPr lang="en-US" sz="2200" dirty="0"/>
+              <a:t>Control via easy-to-read config file</a:t>
+            </a:r>
+          </a:p>
+          <a:p>
+            <a:pPr marL="365760">
+              <a:spcBef>
+                <a:spcPts val="0"/>
+              </a:spcBef>
+            </a:pPr>
+            <a:r>
+              <a:rPr lang="en-US" sz="2200" dirty="0"/>
+              <a:t>Schedule it to run with </a:t>
+            </a:r>
+            <a:r>
+              <a:rPr lang="en-US" sz="2200" dirty="0" err="1"/>
+              <a:t>cron</a:t>
+            </a:r>
+            <a:r>
+              <a:rPr lang="en-US" sz="2200" dirty="0"/>
+              <a:t> or Task Scheduler or as a CI job step</a:t>
+            </a:r>
+          </a:p>
+          <a:p>
+            <a:pPr marL="365760">
+              <a:spcBef>
+                <a:spcPts val="0"/>
+              </a:spcBef>
+            </a:pPr>
+            <a:r>
+              <a:rPr lang="en-US" sz="2200" dirty="0"/>
+              <a:t>Run it under a Jira API key (cloud) or dedicated username (server)</a:t>
+            </a:r>
+          </a:p>
+          <a:p>
+            <a:pPr marL="365760">
+              <a:spcBef>
+                <a:spcPts val="0"/>
+              </a:spcBef>
+            </a:pPr>
+            <a:r>
+              <a:rPr lang="en-US" sz="2200" dirty="0"/>
+              <a:t>Uses </a:t>
+            </a:r>
+            <a:r>
+              <a:rPr lang="en-US" sz="2200" dirty="0" err="1"/>
+              <a:t>pyGitHub</a:t>
+            </a:r>
+            <a:r>
+              <a:rPr lang="en-US" sz="2200" dirty="0"/>
+              <a:t> and </a:t>
+            </a:r>
+            <a:r>
+              <a:rPr lang="en-US" sz="2200" dirty="0" err="1"/>
+              <a:t>jira</a:t>
+            </a:r>
+            <a:r>
+              <a:rPr lang="en-US" sz="2200" dirty="0"/>
+              <a:t>-python libraries</a:t>
+            </a:r>
+          </a:p>
+          <a:p>
+            <a:pPr marL="365760">
+              <a:spcBef>
+                <a:spcPts val="0"/>
+              </a:spcBef>
+            </a:pPr>
+            <a:r>
+              <a:rPr lang="en-US" sz="2200" b="1" dirty="0">
+                <a:solidFill>
+                  <a:srgbClr val="00B050"/>
+                </a:solidFill>
+              </a:rPr>
+              <a:t>Want a feature to work differently? Change it yourself!</a:t>
+            </a:r>
+          </a:p>
+          <a:p>
+            <a:pPr marL="365760">
+              <a:spcBef>
+                <a:spcPts val="0"/>
+              </a:spcBef>
+            </a:pPr>
+            <a:r>
+              <a:rPr lang="en-US" sz="2200" dirty="0">
+                <a:solidFill>
+                  <a:srgbClr val="FF0000"/>
+                </a:solidFill>
+              </a:rPr>
+              <a:t>My recommended option to start with, if you want to roll your own</a:t>
+            </a:r>
+          </a:p>
+          <a:p>
+            <a:pPr marL="365760">
+              <a:spcBef>
+                <a:spcPts val="0"/>
+              </a:spcBef>
+            </a:pPr>
+            <a:r>
+              <a:rPr lang="en-US" sz="2200" dirty="0">
+                <a:hlinkClick r:id="rId2"/>
+              </a:rPr>
+              <a:t>http://github.com/bobk/jiragithub</a:t>
+            </a:r>
+            <a:endParaRPr lang="en-US" sz="2200" dirty="0">
+              <a:solidFill>
+                <a:srgbClr val="FF0000"/>
+              </a:solidFill>
+            </a:endParaRPr>
+          </a:p>
+          <a:p>
+            <a:pPr marL="22860" indent="0">
+              <a:spcBef>
+                <a:spcPts val="0"/>
+              </a:spcBef>
+              <a:buNone/>
+            </a:pPr>
+            <a:endParaRPr lang="en-US" sz="2200" dirty="0">
+              <a:solidFill>
+                <a:srgbClr val="FF0000"/>
+              </a:solidFill>
+            </a:endParaRPr>
+          </a:p>
+        </p:txBody>
+      </p:sp>
+    </p:spTree>
+    <p:extLst>
+      <p:ext uri="{BB962C8B-B14F-4D97-AF65-F5344CB8AC3E}">
+        <p14:creationId xmlns:p14="http://schemas.microsoft.com/office/powerpoint/2010/main" val="2043386224"/>
+      </p:ext>
+    </p:extLst>
+  </p:cSld>
+  <p:clrMapOvr>
+    <a:masterClrMapping/>
+  </p:clrMapOvr>
+</p:sld>
+</file>
+
+<file path=ppt/slides/slide11.xml><?xml version="1.0" encoding="utf-8"?>
 <p:sld xmlns:a="http://schemas.openxmlformats.org/drawingml/2006/main" xmlns:r="http://schemas.openxmlformats.org/officeDocument/2006/relationships" xmlns:p="http://schemas.openxmlformats.org/presentationml/2006/main">
   <p:cSld>
     <p:bg>
@@ -3519,7 +3806,7 @@
 </p:sld>
 </file>
 
-<file path=ppt/slides/slide11.xml><?xml version="1.0" encoding="utf-8"?>
+<file path=ppt/slides/slide12.xml><?xml version="1.0" encoding="utf-8"?>
 <p:sld xmlns:a="http://schemas.openxmlformats.org/drawingml/2006/main" xmlns:r="http://schemas.openxmlformats.org/officeDocument/2006/relationships" xmlns:p="http://schemas.openxmlformats.org/presentationml/2006/main">
   <p:cSld>
     <p:bg>
@@ -4230,7 +4517,7 @@
                   <a:srgbClr val="00B0F0"/>
                 </a:solidFill>
               </a:rPr>
-              <a:t>product managers, release managers</a:t>
+              <a:t>product managers, release managers, dev leads</a:t>
             </a:r>
             <a:r>
               <a:rPr lang="en-US" sz="2000" b="1" dirty="0"/>
@@ -4276,7 +4563,7 @@
                   <a:srgbClr val="FF0000"/>
                 </a:solidFill>
               </a:rPr>
-              <a:t>scrum masters, dev team leads</a:t>
+              <a:t>scrum masters, dev leads</a:t>
             </a:r>
             <a:r>
               <a:rPr lang="en-US" sz="2000" dirty="0"/>
@@ -4299,7 +4586,7 @@
                   <a:srgbClr val="00B0F0"/>
                 </a:solidFill>
               </a:rPr>
-              <a:t>release managers</a:t>
+              <a:t>dev lead, DevOps engineers</a:t>
             </a:r>
             <a:r>
               <a:rPr lang="en-US" sz="2000" dirty="0"/>
@@ -5902,6 +6189,107 @@
           <a:p>
             <a:r>
               <a:rPr lang="en-US" sz="2800" b="1" dirty="0"/>
+              <a:t>GitHub sample commit</a:t>
+            </a:r>
+            <a:endParaRPr lang="en-US" sz="2800" dirty="0"/>
+          </a:p>
+        </p:txBody>
+      </p:sp>
+      <p:pic>
+        <p:nvPicPr>
+          <p:cNvPr id="4" name="Picture 3">
+            <a:extLst>
+              <a:ext uri="{FF2B5EF4-FFF2-40B4-BE49-F238E27FC236}">
+                <a16:creationId xmlns:a16="http://schemas.microsoft.com/office/drawing/2014/main" id="{4D1918B5-514D-4222-992A-4C8550F168CA}"/>
+              </a:ext>
+            </a:extLst>
+          </p:cNvPr>
+          <p:cNvPicPr>
+            <a:picLocks noChangeAspect="1"/>
+          </p:cNvPicPr>
+          <p:nvPr/>
+        </p:nvPicPr>
+        <p:blipFill>
+          <a:blip r:embed="rId2"/>
+          <a:stretch>
+            <a:fillRect/>
+          </a:stretch>
+        </p:blipFill>
+        <p:spPr>
+          <a:xfrm>
+            <a:off x="152400" y="1524000"/>
+            <a:ext cx="8844561" cy="4574473"/>
+          </a:xfrm>
+          <a:prstGeom prst="rect">
+            <a:avLst/>
+          </a:prstGeom>
+        </p:spPr>
+      </p:pic>
+    </p:spTree>
+    <p:extLst>
+      <p:ext uri="{BB962C8B-B14F-4D97-AF65-F5344CB8AC3E}">
+        <p14:creationId xmlns:p14="http://schemas.microsoft.com/office/powerpoint/2010/main" val="305660930"/>
+      </p:ext>
+    </p:extLst>
+  </p:cSld>
+  <p:clrMapOvr>
+    <a:masterClrMapping/>
+  </p:clrMapOvr>
+</p:sld>
+</file>
+
+<file path=ppt/slides/slide7.xml><?xml version="1.0" encoding="utf-8"?>
+<p:sld xmlns:a="http://schemas.openxmlformats.org/drawingml/2006/main" xmlns:r="http://schemas.openxmlformats.org/officeDocument/2006/relationships" xmlns:p="http://schemas.openxmlformats.org/presentationml/2006/main">
+  <p:cSld>
+    <p:bg>
+      <p:bgPr>
+        <a:solidFill>
+          <a:schemeClr val="accent1">
+            <a:lumMod val="20000"/>
+            <a:lumOff val="80000"/>
+          </a:schemeClr>
+        </a:solidFill>
+        <a:effectLst/>
+      </p:bgPr>
+    </p:bg>
+    <p:spTree>
+      <p:nvGrpSpPr>
+        <p:cNvPr id="1" name=""/>
+        <p:cNvGrpSpPr/>
+        <p:nvPr/>
+      </p:nvGrpSpPr>
+      <p:grpSpPr>
+        <a:xfrm>
+          <a:off x="0" y="0"/>
+          <a:ext cx="0" cy="0"/>
+          <a:chOff x="0" y="0"/>
+          <a:chExt cx="0" cy="0"/>
+        </a:xfrm>
+      </p:grpSpPr>
+      <p:sp>
+        <p:nvSpPr>
+          <p:cNvPr id="2" name="Title 1"/>
+          <p:cNvSpPr>
+            <a:spLocks noGrp="1"/>
+          </p:cNvSpPr>
+          <p:nvPr>
+            <p:ph type="title"/>
+          </p:nvPr>
+        </p:nvSpPr>
+        <p:spPr>
+          <a:xfrm>
+            <a:off x="457200" y="274638"/>
+            <a:ext cx="8229600" cy="1143000"/>
+          </a:xfrm>
+        </p:spPr>
+        <p:txBody>
+          <a:bodyPr>
+            <a:noAutofit/>
+          </a:bodyPr>
+          <a:lstStyle/>
+          <a:p>
+            <a:r>
+              <a:rPr lang="en-US" sz="2800" b="1" dirty="0"/>
               <a:t>Git Integration for Jira</a:t>
             </a:r>
             <a:r>
@@ -5912,13 +6300,7 @@
               <a:rPr lang="en-US" sz="2800" dirty="0" err="1"/>
               <a:t>BigBrassBand</a:t>
             </a:r>
-            <a:br>
-              <a:rPr lang="en-US" sz="2800" dirty="0"/>
-            </a:br>
-            <a:r>
-              <a:rPr lang="en-US" sz="2800" dirty="0"/>
-              <a:t>Screen Shots</a:t>
-            </a:r>
+            <a:endParaRPr lang="en-US" sz="2800" dirty="0"/>
           </a:p>
         </p:txBody>
       </p:sp>
@@ -5965,278 +6347,6 @@
 </p:sld>
 </file>
 
-<file path=ppt/slides/slide7.xml><?xml version="1.0" encoding="utf-8"?>
-<p:sld xmlns:a="http://schemas.openxmlformats.org/drawingml/2006/main" xmlns:r="http://schemas.openxmlformats.org/officeDocument/2006/relationships" xmlns:p="http://schemas.openxmlformats.org/presentationml/2006/main">
-  <p:cSld>
-    <p:bg>
-      <p:bgPr>
-        <a:solidFill>
-          <a:schemeClr val="accent1">
-            <a:lumMod val="20000"/>
-            <a:lumOff val="80000"/>
-          </a:schemeClr>
-        </a:solidFill>
-        <a:effectLst/>
-      </p:bgPr>
-    </p:bg>
-    <p:spTree>
-      <p:nvGrpSpPr>
-        <p:cNvPr id="1" name=""/>
-        <p:cNvGrpSpPr/>
-        <p:nvPr/>
-      </p:nvGrpSpPr>
-      <p:grpSpPr>
-        <a:xfrm>
-          <a:off x="0" y="0"/>
-          <a:ext cx="0" cy="0"/>
-          <a:chOff x="0" y="0"/>
-          <a:chExt cx="0" cy="0"/>
-        </a:xfrm>
-      </p:grpSpPr>
-      <p:sp>
-        <p:nvSpPr>
-          <p:cNvPr id="2" name="Title 1"/>
-          <p:cNvSpPr>
-            <a:spLocks noGrp="1"/>
-          </p:cNvSpPr>
-          <p:nvPr>
-            <p:ph type="title"/>
-          </p:nvPr>
-        </p:nvSpPr>
-        <p:spPr>
-          <a:xfrm>
-            <a:off x="457200" y="274638"/>
-            <a:ext cx="8229600" cy="1143000"/>
-          </a:xfrm>
-        </p:spPr>
-        <p:txBody>
-          <a:bodyPr>
-            <a:noAutofit/>
-          </a:bodyPr>
-          <a:lstStyle/>
-          <a:p>
-            <a:r>
-              <a:rPr lang="en-US" sz="2800" b="1" dirty="0"/>
-              <a:t>Git Integration for Jira</a:t>
-            </a:r>
-            <a:r>
-              <a:rPr lang="en-US" sz="2800" dirty="0"/>
-              <a:t> plug-in from </a:t>
-            </a:r>
-            <a:r>
-              <a:rPr lang="en-US" sz="2800" dirty="0" err="1"/>
-              <a:t>BigBrassBand</a:t>
-            </a:r>
-            <a:br>
-              <a:rPr lang="en-US" sz="2800" dirty="0"/>
-            </a:br>
-            <a:r>
-              <a:rPr lang="en-US" sz="2800" dirty="0"/>
-              <a:t>Features</a:t>
-            </a:r>
-            <a:endParaRPr lang="en-US" sz="3200" dirty="0"/>
-          </a:p>
-        </p:txBody>
-      </p:sp>
-      <p:sp>
-        <p:nvSpPr>
-          <p:cNvPr id="4" name="Content Placeholder 2">
-            <a:extLst>
-              <a:ext uri="{FF2B5EF4-FFF2-40B4-BE49-F238E27FC236}">
-                <a16:creationId xmlns:a16="http://schemas.microsoft.com/office/drawing/2014/main" id="{28AD2EA2-2568-4015-953C-72DE05BE5540}"/>
-              </a:ext>
-            </a:extLst>
-          </p:cNvPr>
-          <p:cNvSpPr>
-            <a:spLocks noGrp="1"/>
-          </p:cNvSpPr>
-          <p:nvPr>
-            <p:ph idx="1"/>
-          </p:nvPr>
-        </p:nvSpPr>
-        <p:spPr>
-          <a:xfrm>
-            <a:off x="457200" y="1600200"/>
-            <a:ext cx="8229600" cy="4983162"/>
-          </a:xfrm>
-        </p:spPr>
-        <p:txBody>
-          <a:bodyPr>
-            <a:noAutofit/>
-          </a:bodyPr>
-          <a:lstStyle/>
-          <a:p>
-            <a:pPr marL="365760">
-              <a:spcBef>
-                <a:spcPts val="0"/>
-              </a:spcBef>
-            </a:pPr>
-            <a:r>
-              <a:rPr lang="en-US" sz="2000" dirty="0"/>
-              <a:t>View Git commit/branch information in Jira</a:t>
-            </a:r>
-          </a:p>
-          <a:p>
-            <a:pPr marL="365760">
-              <a:spcBef>
-                <a:spcPts val="0"/>
-              </a:spcBef>
-            </a:pPr>
-            <a:r>
-              <a:rPr lang="en-US" sz="2000" dirty="0"/>
-              <a:t>Places information in separate tab next to Comments, Work Log</a:t>
-            </a:r>
-          </a:p>
-          <a:p>
-            <a:pPr marL="365760">
-              <a:spcBef>
-                <a:spcPts val="0"/>
-              </a:spcBef>
-            </a:pPr>
-            <a:r>
-              <a:rPr lang="en-US" sz="2000" dirty="0"/>
-              <a:t>“Smart Commits” – add comments, transition issues etc. via commit messages</a:t>
-            </a:r>
-          </a:p>
-          <a:p>
-            <a:pPr marL="365760">
-              <a:spcBef>
-                <a:spcPts val="0"/>
-              </a:spcBef>
-            </a:pPr>
-            <a:r>
-              <a:rPr lang="en-US" sz="2000" dirty="0"/>
-              <a:t>Manually associate commits with issues when needed</a:t>
-            </a:r>
-          </a:p>
-          <a:p>
-            <a:pPr marL="365760">
-              <a:spcBef>
-                <a:spcPts val="0"/>
-              </a:spcBef>
-            </a:pPr>
-            <a:r>
-              <a:rPr lang="en-US" sz="2000" dirty="0"/>
-              <a:t>Direct links to branches and commits</a:t>
-            </a:r>
-          </a:p>
-          <a:p>
-            <a:pPr marL="365760">
-              <a:spcBef>
-                <a:spcPts val="0"/>
-              </a:spcBef>
-            </a:pPr>
-            <a:r>
-              <a:rPr lang="en-US" sz="2000" dirty="0"/>
-              <a:t>Git-specific JQL fields (</a:t>
-            </a:r>
-            <a:r>
-              <a:rPr lang="en-US" sz="2000" dirty="0" err="1"/>
-              <a:t>gitCommitsReferenced</a:t>
-            </a:r>
-            <a:r>
-              <a:rPr lang="en-US" sz="2000" dirty="0"/>
-              <a:t>, </a:t>
-            </a:r>
-            <a:r>
-              <a:rPr lang="en-US" sz="2000" dirty="0" err="1"/>
-              <a:t>gitBranch</a:t>
-            </a:r>
-            <a:r>
-              <a:rPr lang="en-US" sz="2000" dirty="0"/>
-              <a:t>)</a:t>
-            </a:r>
-          </a:p>
-          <a:p>
-            <a:pPr marL="365760">
-              <a:spcBef>
-                <a:spcPts val="0"/>
-              </a:spcBef>
-            </a:pPr>
-            <a:r>
-              <a:rPr lang="en-US" sz="2000" dirty="0"/>
-              <a:t>Create branches from Jira</a:t>
-            </a:r>
-          </a:p>
-          <a:p>
-            <a:pPr marL="365760">
-              <a:spcBef>
-                <a:spcPts val="0"/>
-              </a:spcBef>
-            </a:pPr>
-            <a:r>
-              <a:rPr lang="en-US" sz="2000" dirty="0"/>
-              <a:t>Create pull requests from Jira</a:t>
-            </a:r>
-          </a:p>
-          <a:p>
-            <a:pPr marL="365760">
-              <a:spcBef>
-                <a:spcPts val="0"/>
-              </a:spcBef>
-            </a:pPr>
-            <a:r>
-              <a:rPr lang="en-US" sz="2000" dirty="0"/>
-              <a:t>Permissions model to control viewing Git data from Jira</a:t>
-            </a:r>
-          </a:p>
-          <a:p>
-            <a:pPr marL="365760">
-              <a:spcBef>
-                <a:spcPts val="0"/>
-              </a:spcBef>
-            </a:pPr>
-            <a:r>
-              <a:rPr lang="en-US" sz="2000" dirty="0">
-                <a:solidFill>
-                  <a:srgbClr val="FF0000"/>
-                </a:solidFill>
-              </a:rPr>
-              <a:t>My recommended option, if you choose to go the plug-in route</a:t>
-            </a:r>
-          </a:p>
-          <a:p>
-            <a:pPr marL="365760">
-              <a:spcBef>
-                <a:spcPts val="0"/>
-              </a:spcBef>
-            </a:pPr>
-            <a:r>
-              <a:rPr lang="en-US" sz="2000" dirty="0">
-                <a:hlinkClick r:id="rId2"/>
-              </a:rPr>
-              <a:t>https://bigbrassband.com</a:t>
-            </a:r>
-            <a:endParaRPr lang="en-US" sz="2000" dirty="0"/>
-          </a:p>
-          <a:p>
-            <a:pPr marL="22860" indent="0">
-              <a:spcBef>
-                <a:spcPts val="0"/>
-              </a:spcBef>
-              <a:buNone/>
-            </a:pPr>
-            <a:endParaRPr lang="en-US" sz="2000" dirty="0">
-              <a:solidFill>
-                <a:srgbClr val="FF0000"/>
-              </a:solidFill>
-            </a:endParaRPr>
-          </a:p>
-        </p:txBody>
-      </p:sp>
-    </p:spTree>
-    <p:extLst>
-      <p:ext uri="{BB962C8B-B14F-4D97-AF65-F5344CB8AC3E}">
-        <p14:creationId xmlns:p14="http://schemas.microsoft.com/office/powerpoint/2010/main" val="641919687"/>
-      </p:ext>
-    </p:extLst>
-  </p:cSld>
-  <p:clrMapOvr>
-    <a:masterClrMapping/>
-  </p:clrMapOvr>
-</p:sld>
-</file>
-
 <file path=ppt/slides/slide8.xml><?xml version="1.0" encoding="utf-8"?>
 <p:sld xmlns:a="http://schemas.openxmlformats.org/drawingml/2006/main" xmlns:r="http://schemas.openxmlformats.org/officeDocument/2006/relationships" xmlns:p="http://schemas.openxmlformats.org/presentationml/2006/main">
   <p:cSld>
@@ -6288,57 +6398,218 @@
           <a:lstStyle/>
           <a:p>
             <a:r>
-              <a:rPr lang="en-US" sz="2800" b="1" dirty="0" err="1"/>
-              <a:t>jiragithub</a:t>
+              <a:rPr lang="en-US" sz="2800" b="1" dirty="0"/>
+              <a:t>Git Integration for Jira</a:t>
             </a:r>
             <a:r>
               <a:rPr lang="en-US" sz="2800" dirty="0"/>
-              <a:t> script</a:t>
+              <a:t> plug-in from </a:t>
+            </a:r>
+            <a:r>
+              <a:rPr lang="en-US" sz="2800" dirty="0" err="1"/>
+              <a:t>BigBrassBand</a:t>
             </a:r>
             <a:br>
               <a:rPr lang="en-US" sz="2800" dirty="0"/>
             </a:br>
             <a:r>
               <a:rPr lang="en-US" sz="2800" dirty="0"/>
-              <a:t>Screen Shots</a:t>
-            </a:r>
-          </a:p>
-        </p:txBody>
-      </p:sp>
-      <p:pic>
-        <p:nvPicPr>
-          <p:cNvPr id="6" name="Picture 5">
+              <a:t>Features</a:t>
+            </a:r>
+            <a:endParaRPr lang="en-US" sz="3200" dirty="0"/>
+          </a:p>
+        </p:txBody>
+      </p:sp>
+      <p:sp>
+        <p:nvSpPr>
+          <p:cNvPr id="4" name="Content Placeholder 2">
             <a:extLst>
               <a:ext uri="{FF2B5EF4-FFF2-40B4-BE49-F238E27FC236}">
-                <a16:creationId xmlns:a16="http://schemas.microsoft.com/office/drawing/2014/main" id="{8EDA38BE-CD75-48B0-A64D-9791F6B3CD5A}"/>
+                <a16:creationId xmlns:a16="http://schemas.microsoft.com/office/drawing/2014/main" id="{28AD2EA2-2568-4015-953C-72DE05BE5540}"/>
               </a:ext>
             </a:extLst>
           </p:cNvPr>
-          <p:cNvPicPr>
-            <a:picLocks noChangeAspect="1"/>
-          </p:cNvPicPr>
-          <p:nvPr/>
-        </p:nvPicPr>
-        <p:blipFill>
-          <a:blip r:embed="rId2"/>
-          <a:stretch>
-            <a:fillRect/>
-          </a:stretch>
-        </p:blipFill>
+          <p:cNvSpPr>
+            <a:spLocks noGrp="1"/>
+          </p:cNvSpPr>
+          <p:nvPr>
+            <p:ph idx="1"/>
+          </p:nvPr>
+        </p:nvSpPr>
         <p:spPr>
           <a:xfrm>
-            <a:off x="76200" y="1662228"/>
-            <a:ext cx="8915400" cy="5119572"/>
+            <a:off x="457200" y="1600200"/>
+            <a:ext cx="8229600" cy="4983162"/>
           </a:xfrm>
-          <a:prstGeom prst="rect">
-            <a:avLst/>
-          </a:prstGeom>
         </p:spPr>
-      </p:pic>
+        <p:txBody>
+          <a:bodyPr>
+            <a:noAutofit/>
+          </a:bodyPr>
+          <a:lstStyle/>
+          <a:p>
+            <a:pPr marL="365760">
+              <a:spcBef>
+                <a:spcPts val="0"/>
+              </a:spcBef>
+            </a:pPr>
+            <a:r>
+              <a:rPr lang="en-US" sz="2200" dirty="0"/>
+              <a:t>View Git commit/branch information in Jira</a:t>
+            </a:r>
+          </a:p>
+          <a:p>
+            <a:pPr marL="365760">
+              <a:spcBef>
+                <a:spcPts val="0"/>
+              </a:spcBef>
+            </a:pPr>
+            <a:r>
+              <a:rPr lang="en-US" sz="2200" dirty="0"/>
+              <a:t>Places information in separate tab next to Comments, Work Log</a:t>
+            </a:r>
+          </a:p>
+          <a:p>
+            <a:pPr marL="365760">
+              <a:spcBef>
+                <a:spcPts val="0"/>
+              </a:spcBef>
+            </a:pPr>
+            <a:r>
+              <a:rPr lang="en-US" sz="2200" dirty="0"/>
+              <a:t>“Smart Commits” – add comments, transition issues etc. via commit messages</a:t>
+            </a:r>
+          </a:p>
+          <a:p>
+            <a:pPr marL="365760">
+              <a:spcBef>
+                <a:spcPts val="0"/>
+              </a:spcBef>
+            </a:pPr>
+            <a:r>
+              <a:rPr lang="en-US" sz="2200" dirty="0"/>
+              <a:t>Manually associate commits with issues when needed</a:t>
+            </a:r>
+          </a:p>
+          <a:p>
+            <a:pPr marL="365760">
+              <a:spcBef>
+                <a:spcPts val="0"/>
+              </a:spcBef>
+            </a:pPr>
+            <a:r>
+              <a:rPr lang="en-US" sz="2200" dirty="0"/>
+              <a:t>Direct links to branches and commits</a:t>
+            </a:r>
+          </a:p>
+          <a:p>
+            <a:pPr marL="365760">
+              <a:spcBef>
+                <a:spcPts val="0"/>
+              </a:spcBef>
+            </a:pPr>
+            <a:r>
+              <a:rPr lang="en-US" sz="2200" dirty="0"/>
+              <a:t>Git-specific JQL fields (</a:t>
+            </a:r>
+            <a:r>
+              <a:rPr lang="en-US" sz="2200" dirty="0" err="1"/>
+              <a:t>gitCommitsReferenced</a:t>
+            </a:r>
+            <a:r>
+              <a:rPr lang="en-US" sz="2200" dirty="0"/>
+              <a:t>, </a:t>
+            </a:r>
+            <a:r>
+              <a:rPr lang="en-US" sz="2200" dirty="0" err="1"/>
+              <a:t>gitBranch</a:t>
+            </a:r>
+            <a:r>
+              <a:rPr lang="en-US" sz="2200" dirty="0"/>
+              <a:t>)</a:t>
+            </a:r>
+          </a:p>
+          <a:p>
+            <a:pPr marL="365760">
+              <a:spcBef>
+                <a:spcPts val="0"/>
+              </a:spcBef>
+            </a:pPr>
+            <a:r>
+              <a:rPr lang="en-US" sz="2200" dirty="0"/>
+              <a:t>Create branches from Jira</a:t>
+            </a:r>
+          </a:p>
+          <a:p>
+            <a:pPr marL="365760">
+              <a:spcBef>
+                <a:spcPts val="0"/>
+              </a:spcBef>
+            </a:pPr>
+            <a:r>
+              <a:rPr lang="en-US" sz="2200" dirty="0"/>
+              <a:t>Create pull requests from Jira</a:t>
+            </a:r>
+          </a:p>
+          <a:p>
+            <a:pPr marL="365760">
+              <a:spcBef>
+                <a:spcPts val="0"/>
+              </a:spcBef>
+            </a:pPr>
+            <a:r>
+              <a:rPr lang="en-US" sz="2200" dirty="0"/>
+              <a:t>Permissions model to control viewing Git data from Jira</a:t>
+            </a:r>
+          </a:p>
+          <a:p>
+            <a:pPr marL="365760">
+              <a:spcBef>
+                <a:spcPts val="0"/>
+              </a:spcBef>
+            </a:pPr>
+            <a:r>
+              <a:rPr lang="en-US" sz="2200" dirty="0">
+                <a:solidFill>
+                  <a:srgbClr val="FF0000"/>
+                </a:solidFill>
+              </a:rPr>
+              <a:t>My recommended option, if you choose to go the plug-in route</a:t>
+            </a:r>
+          </a:p>
+          <a:p>
+            <a:pPr marL="365760">
+              <a:spcBef>
+                <a:spcPts val="0"/>
+              </a:spcBef>
+            </a:pPr>
+            <a:r>
+              <a:rPr lang="en-US" sz="2200" dirty="0">
+                <a:hlinkClick r:id="rId2"/>
+              </a:rPr>
+              <a:t>https://bigbrassband.com</a:t>
+            </a:r>
+            <a:endParaRPr lang="en-US" sz="2200" dirty="0"/>
+          </a:p>
+          <a:p>
+            <a:pPr marL="22860" indent="0">
+              <a:spcBef>
+                <a:spcPts val="0"/>
+              </a:spcBef>
+              <a:buNone/>
+            </a:pPr>
+            <a:endParaRPr lang="en-US" sz="2200" dirty="0">
+              <a:solidFill>
+                <a:srgbClr val="FF0000"/>
+              </a:solidFill>
+            </a:endParaRPr>
+          </a:p>
+        </p:txBody>
+      </p:sp>
     </p:spTree>
     <p:extLst>
       <p:ext uri="{BB962C8B-B14F-4D97-AF65-F5344CB8AC3E}">
-        <p14:creationId xmlns:p14="http://schemas.microsoft.com/office/powerpoint/2010/main" val="1008999639"/>
+        <p14:creationId xmlns:p14="http://schemas.microsoft.com/office/powerpoint/2010/main" val="641919687"/>
       </p:ext>
     </p:extLst>
   </p:cSld>
@@ -6406,222 +6677,43 @@
               <a:rPr lang="en-US" sz="2800" dirty="0"/>
               <a:t> script</a:t>
             </a:r>
-            <a:br>
-              <a:rPr lang="en-US" sz="2800" dirty="0"/>
-            </a:br>
-            <a:r>
-              <a:rPr lang="en-US" sz="2800" dirty="0"/>
-              <a:t>Features</a:t>
-            </a:r>
-          </a:p>
-        </p:txBody>
-      </p:sp>
-      <p:sp>
-        <p:nvSpPr>
-          <p:cNvPr id="4" name="Content Placeholder 2">
+          </a:p>
+        </p:txBody>
+      </p:sp>
+      <p:pic>
+        <p:nvPicPr>
+          <p:cNvPr id="6" name="Picture 5">
             <a:extLst>
               <a:ext uri="{FF2B5EF4-FFF2-40B4-BE49-F238E27FC236}">
-                <a16:creationId xmlns:a16="http://schemas.microsoft.com/office/drawing/2014/main" id="{28AD2EA2-2568-4015-953C-72DE05BE5540}"/>
+                <a16:creationId xmlns:a16="http://schemas.microsoft.com/office/drawing/2014/main" id="{8EDA38BE-CD75-48B0-A64D-9791F6B3CD5A}"/>
               </a:ext>
             </a:extLst>
           </p:cNvPr>
-          <p:cNvSpPr>
-            <a:spLocks noGrp="1"/>
-          </p:cNvSpPr>
-          <p:nvPr>
-            <p:ph idx="1"/>
-          </p:nvPr>
-        </p:nvSpPr>
+          <p:cNvPicPr>
+            <a:picLocks noChangeAspect="1"/>
+          </p:cNvPicPr>
+          <p:nvPr/>
+        </p:nvPicPr>
+        <p:blipFill>
+          <a:blip r:embed="rId2"/>
+          <a:stretch>
+            <a:fillRect/>
+          </a:stretch>
+        </p:blipFill>
         <p:spPr>
           <a:xfrm>
-            <a:off x="304800" y="1600200"/>
-            <a:ext cx="8458200" cy="4983162"/>
+            <a:off x="76200" y="1662228"/>
+            <a:ext cx="8915400" cy="5119572"/>
           </a:xfrm>
+          <a:prstGeom prst="rect">
+            <a:avLst/>
+          </a:prstGeom>
         </p:spPr>
-        <p:txBody>
-          <a:bodyPr>
-            <a:noAutofit/>
-          </a:bodyPr>
-          <a:lstStyle/>
-          <a:p>
-            <a:pPr marL="365760">
-              <a:spcBef>
-                <a:spcPts val="0"/>
-              </a:spcBef>
-            </a:pPr>
-            <a:r>
-              <a:rPr lang="en-US" sz="2000" dirty="0"/>
-              <a:t>View Git commit/branch information in Jira</a:t>
-            </a:r>
-          </a:p>
-          <a:p>
-            <a:pPr marL="365760">
-              <a:spcBef>
-                <a:spcPts val="0"/>
-              </a:spcBef>
-            </a:pPr>
-            <a:r>
-              <a:rPr lang="en-US" sz="2000" dirty="0"/>
-              <a:t>Places Git commit information in Jira as comments (user-definable format)</a:t>
-            </a:r>
-          </a:p>
-          <a:p>
-            <a:pPr marL="365760">
-              <a:spcBef>
-                <a:spcPts val="0"/>
-              </a:spcBef>
-            </a:pPr>
-            <a:r>
-              <a:rPr lang="en-US" sz="2000" dirty="0"/>
-              <a:t>“Semi-Smart Commits” - transition + reassign issues via commit messages</a:t>
-            </a:r>
-          </a:p>
-          <a:p>
-            <a:pPr marL="365760">
-              <a:spcBef>
-                <a:spcPts val="0"/>
-              </a:spcBef>
-            </a:pPr>
-            <a:r>
-              <a:rPr lang="en-US" sz="2000" dirty="0"/>
-              <a:t>Also inserts direct links to branches and commits</a:t>
-            </a:r>
-          </a:p>
-          <a:p>
-            <a:pPr marL="365760">
-              <a:spcBef>
-                <a:spcPts val="0"/>
-              </a:spcBef>
-            </a:pPr>
-            <a:r>
-              <a:rPr lang="en-US" sz="2000" dirty="0"/>
-              <a:t>Control via easy-to-read config file</a:t>
-            </a:r>
-          </a:p>
-          <a:p>
-            <a:pPr marL="365760">
-              <a:spcBef>
-                <a:spcPts val="0"/>
-              </a:spcBef>
-            </a:pPr>
-            <a:r>
-              <a:rPr lang="en-US" sz="2000" dirty="0"/>
-              <a:t>Schedule it to run with </a:t>
-            </a:r>
-            <a:r>
-              <a:rPr lang="en-US" sz="2000" dirty="0" err="1"/>
-              <a:t>cron</a:t>
-            </a:r>
-            <a:r>
-              <a:rPr lang="en-US" sz="2000" dirty="0"/>
-              <a:t> or Task Scheduler or as a CI job step</a:t>
-            </a:r>
-          </a:p>
-          <a:p>
-            <a:pPr marL="365760">
-              <a:spcBef>
-                <a:spcPts val="0"/>
-              </a:spcBef>
-            </a:pPr>
-            <a:r>
-              <a:rPr lang="en-US" sz="2000" dirty="0"/>
-              <a:t>Run it under a Jira API key (cloud) or dedicated username (server)</a:t>
-            </a:r>
-          </a:p>
-          <a:p>
-            <a:pPr marL="365760">
-              <a:spcBef>
-                <a:spcPts val="0"/>
-              </a:spcBef>
-            </a:pPr>
-            <a:r>
-              <a:rPr lang="en-US" sz="2000" dirty="0"/>
-              <a:t>Uses </a:t>
-            </a:r>
-            <a:r>
-              <a:rPr lang="en-US" sz="2000" dirty="0" err="1"/>
-              <a:t>pyGitHub</a:t>
-            </a:r>
-            <a:r>
-              <a:rPr lang="en-US" sz="2000" dirty="0"/>
-              <a:t> and </a:t>
-            </a:r>
-            <a:r>
-              <a:rPr lang="en-US" sz="2000" dirty="0" err="1"/>
-              <a:t>jira</a:t>
-            </a:r>
-            <a:r>
-              <a:rPr lang="en-US" sz="2000" dirty="0"/>
-              <a:t>-python libraries</a:t>
-            </a:r>
-          </a:p>
-          <a:p>
-            <a:pPr marL="365760">
-              <a:spcBef>
-                <a:spcPts val="0"/>
-              </a:spcBef>
-            </a:pPr>
-            <a:r>
-              <a:rPr lang="en-US" sz="2000" b="1" dirty="0">
-                <a:solidFill>
-                  <a:srgbClr val="00B050"/>
-                </a:solidFill>
-              </a:rPr>
-              <a:t>Want a feature to work differently? Change it yourself!</a:t>
-            </a:r>
-          </a:p>
-          <a:p>
-            <a:pPr marL="365760">
-              <a:spcBef>
-                <a:spcPts val="0"/>
-              </a:spcBef>
-            </a:pPr>
-            <a:r>
-              <a:rPr lang="en-US" sz="2000" dirty="0">
-                <a:solidFill>
-                  <a:srgbClr val="FF0000"/>
-                </a:solidFill>
-              </a:rPr>
-              <a:t>My recommended option to start with, if you want to roll your own</a:t>
-            </a:r>
-          </a:p>
-          <a:p>
-            <a:pPr marL="365760">
-              <a:spcBef>
-                <a:spcPts val="0"/>
-              </a:spcBef>
-            </a:pPr>
-            <a:r>
-              <a:rPr lang="en-US" sz="2000" dirty="0">
-                <a:hlinkClick r:id="rId2"/>
-              </a:rPr>
-              <a:t>http://github.com/bobk/jiragithub</a:t>
-            </a:r>
-            <a:endParaRPr lang="en-US" sz="2000" dirty="0">
-              <a:solidFill>
-                <a:srgbClr val="FF0000"/>
-              </a:solidFill>
-            </a:endParaRPr>
-          </a:p>
-          <a:p>
-            <a:pPr marL="22860" indent="0">
-              <a:spcBef>
-                <a:spcPts val="0"/>
-              </a:spcBef>
-              <a:buNone/>
-            </a:pPr>
-            <a:endParaRPr lang="en-US" sz="2000" dirty="0">
-              <a:solidFill>
-                <a:srgbClr val="FF0000"/>
-              </a:solidFill>
-            </a:endParaRPr>
-          </a:p>
-        </p:txBody>
-      </p:sp>
+      </p:pic>
     </p:spTree>
     <p:extLst>
       <p:ext uri="{BB962C8B-B14F-4D97-AF65-F5344CB8AC3E}">
-        <p14:creationId xmlns:p14="http://schemas.microsoft.com/office/powerpoint/2010/main" val="2043386224"/>
+        <p14:creationId xmlns:p14="http://schemas.microsoft.com/office/powerpoint/2010/main" val="1008999639"/>
       </p:ext>
     </p:extLst>
   </p:cSld>

</xml_diff>

<commit_message>
JIRAGITHUB-7 additional small changes based on feedback from Mar 25
</commit_message>
<xml_diff>
--- a/Git Integration Options for Jira.pptx
+++ b/Git Integration Options for Jira.pptx
@@ -313,7 +313,7 @@
           <a:p>
             <a:fld id="{799B01D3-E541-42FD-B1E6-9E7097F8E480}" type="datetimeFigureOut">
               <a:rPr lang="en-US" smtClean="0"/>
-              <a:t>3/22/2020</a:t>
+              <a:t>3/26/2020</a:t>
             </a:fld>
             <a:endParaRPr lang="en-US"/>
           </a:p>
@@ -481,7 +481,7 @@
           <a:p>
             <a:fld id="{799B01D3-E541-42FD-B1E6-9E7097F8E480}" type="datetimeFigureOut">
               <a:rPr lang="en-US" smtClean="0"/>
-              <a:t>3/22/2020</a:t>
+              <a:t>3/26/2020</a:t>
             </a:fld>
             <a:endParaRPr lang="en-US"/>
           </a:p>
@@ -659,7 +659,7 @@
           <a:p>
             <a:fld id="{799B01D3-E541-42FD-B1E6-9E7097F8E480}" type="datetimeFigureOut">
               <a:rPr lang="en-US" smtClean="0"/>
-              <a:t>3/22/2020</a:t>
+              <a:t>3/26/2020</a:t>
             </a:fld>
             <a:endParaRPr lang="en-US"/>
           </a:p>
@@ -811,7 +811,7 @@
           <a:p>
             <a:fld id="{799B01D3-E541-42FD-B1E6-9E7097F8E480}" type="datetimeFigureOut">
               <a:rPr lang="en-US" smtClean="0"/>
-              <a:t>3/22/2020</a:t>
+              <a:t>3/26/2020</a:t>
             </a:fld>
             <a:endParaRPr lang="en-US"/>
           </a:p>
@@ -1096,7 +1096,7 @@
           <a:p>
             <a:fld id="{799B01D3-E541-42FD-B1E6-9E7097F8E480}" type="datetimeFigureOut">
               <a:rPr lang="en-US" smtClean="0"/>
-              <a:t>3/22/2020</a:t>
+              <a:t>3/26/2020</a:t>
             </a:fld>
             <a:endParaRPr lang="en-US"/>
           </a:p>
@@ -1381,7 +1381,7 @@
           <a:p>
             <a:fld id="{799B01D3-E541-42FD-B1E6-9E7097F8E480}" type="datetimeFigureOut">
               <a:rPr lang="en-US" smtClean="0"/>
-              <a:t>3/22/2020</a:t>
+              <a:t>3/26/2020</a:t>
             </a:fld>
             <a:endParaRPr lang="en-US"/>
           </a:p>
@@ -1800,7 +1800,7 @@
           <a:p>
             <a:fld id="{799B01D3-E541-42FD-B1E6-9E7097F8E480}" type="datetimeFigureOut">
               <a:rPr lang="en-US" smtClean="0"/>
-              <a:t>3/22/2020</a:t>
+              <a:t>3/26/2020</a:t>
             </a:fld>
             <a:endParaRPr lang="en-US"/>
           </a:p>
@@ -1917,7 +1917,7 @@
           <a:p>
             <a:fld id="{799B01D3-E541-42FD-B1E6-9E7097F8E480}" type="datetimeFigureOut">
               <a:rPr lang="en-US" smtClean="0"/>
-              <a:t>3/22/2020</a:t>
+              <a:t>3/26/2020</a:t>
             </a:fld>
             <a:endParaRPr lang="en-US"/>
           </a:p>
@@ -2012,7 +2012,7 @@
           <a:p>
             <a:fld id="{799B01D3-E541-42FD-B1E6-9E7097F8E480}" type="datetimeFigureOut">
               <a:rPr lang="en-US" smtClean="0"/>
-              <a:t>3/22/2020</a:t>
+              <a:t>3/26/2020</a:t>
             </a:fld>
             <a:endParaRPr lang="en-US"/>
           </a:p>
@@ -2287,7 +2287,7 @@
           <a:p>
             <a:fld id="{799B01D3-E541-42FD-B1E6-9E7097F8E480}" type="datetimeFigureOut">
               <a:rPr lang="en-US" smtClean="0"/>
-              <a:t>3/22/2020</a:t>
+              <a:t>3/26/2020</a:t>
             </a:fld>
             <a:endParaRPr lang="en-US"/>
           </a:p>
@@ -2539,7 +2539,7 @@
           <a:p>
             <a:fld id="{799B01D3-E541-42FD-B1E6-9E7097F8E480}" type="datetimeFigureOut">
               <a:rPr lang="en-US" smtClean="0"/>
-              <a:t>3/22/2020</a:t>
+              <a:t>3/26/2020</a:t>
             </a:fld>
             <a:endParaRPr lang="en-US"/>
           </a:p>
@@ -2750,7 +2750,7 @@
           <a:p>
             <a:fld id="{799B01D3-E541-42FD-B1E6-9E7097F8E480}" type="datetimeFigureOut">
               <a:rPr lang="en-US" smtClean="0"/>
-              <a:t>3/22/2020</a:t>
+              <a:t>3/26/2020</a:t>
             </a:fld>
             <a:endParaRPr lang="en-US"/>
           </a:p>
@@ -3981,7 +3981,7 @@
           <a:p>
             <a:r>
               <a:rPr lang="en-US" dirty="0"/>
-              <a:t>What is “Git Integration for Jira”?</a:t>
+              <a:t>What is “Git Integration”?</a:t>
             </a:r>
           </a:p>
         </p:txBody>
@@ -5148,7 +5148,7 @@
             </a:pPr>
             <a:r>
               <a:rPr lang="en-US" sz="1400" dirty="0"/>
-              <a:t>** GitHub has “issue” functionality, but not a strong customizable workflow model, and their integration marketplace is not yet as mature as Atlassian’s</a:t>
+              <a:t>** GitHub has “issue” functionality, but not a strong customizable workflow model, and their integration marketplace is not yet as mature as Atlassian’s, IMO</a:t>
             </a:r>
           </a:p>
           <a:p>

</xml_diff>